<commit_message>
Re-organizing sections and visiting proof redundancy
</commit_message>
<xml_diff>
--- a/poly-embed-journal/storyboarding/dependency-graph-result.pptx
+++ b/poly-embed-journal/storyboarding/dependency-graph-result.pptx
@@ -105,6 +105,11 @@
       </a:defRPr>
     </a:lvl9pPr>
   </p:defaultTextStyle>
+  <p:extLst>
+    <p:ext uri="{EFAFB233-063F-42B5-8137-9DF3F51BA10A}">
+      <p15:sldGuideLst xmlns:p15="http://schemas.microsoft.com/office/powerpoint/2012/main"/>
+    </p:ext>
+  </p:extLst>
 </p:presentation>
 </file>
 
@@ -239,7 +244,7 @@
           <a:p>
             <a:fld id="{F2D74960-CDA5-441E-9A34-72182268859C}" type="datetimeFigureOut">
               <a:rPr lang="en-US" smtClean="0"/>
-              <a:t>3/2/2021</a:t>
+              <a:t>3/23/2021</a:t>
             </a:fld>
             <a:endParaRPr lang="en-US"/>
           </a:p>
@@ -409,7 +414,7 @@
           <a:p>
             <a:fld id="{F2D74960-CDA5-441E-9A34-72182268859C}" type="datetimeFigureOut">
               <a:rPr lang="en-US" smtClean="0"/>
-              <a:t>3/2/2021</a:t>
+              <a:t>3/23/2021</a:t>
             </a:fld>
             <a:endParaRPr lang="en-US"/>
           </a:p>
@@ -589,7 +594,7 @@
           <a:p>
             <a:fld id="{F2D74960-CDA5-441E-9A34-72182268859C}" type="datetimeFigureOut">
               <a:rPr lang="en-US" smtClean="0"/>
-              <a:t>3/2/2021</a:t>
+              <a:t>3/23/2021</a:t>
             </a:fld>
             <a:endParaRPr lang="en-US"/>
           </a:p>
@@ -759,7 +764,7 @@
           <a:p>
             <a:fld id="{F2D74960-CDA5-441E-9A34-72182268859C}" type="datetimeFigureOut">
               <a:rPr lang="en-US" smtClean="0"/>
-              <a:t>3/2/2021</a:t>
+              <a:t>3/23/2021</a:t>
             </a:fld>
             <a:endParaRPr lang="en-US"/>
           </a:p>
@@ -1005,7 +1010,7 @@
           <a:p>
             <a:fld id="{F2D74960-CDA5-441E-9A34-72182268859C}" type="datetimeFigureOut">
               <a:rPr lang="en-US" smtClean="0"/>
-              <a:t>3/2/2021</a:t>
+              <a:t>3/23/2021</a:t>
             </a:fld>
             <a:endParaRPr lang="en-US"/>
           </a:p>
@@ -1237,7 +1242,7 @@
           <a:p>
             <a:fld id="{F2D74960-CDA5-441E-9A34-72182268859C}" type="datetimeFigureOut">
               <a:rPr lang="en-US" smtClean="0"/>
-              <a:t>3/2/2021</a:t>
+              <a:t>3/23/2021</a:t>
             </a:fld>
             <a:endParaRPr lang="en-US"/>
           </a:p>
@@ -1604,7 +1609,7 @@
           <a:p>
             <a:fld id="{F2D74960-CDA5-441E-9A34-72182268859C}" type="datetimeFigureOut">
               <a:rPr lang="en-US" smtClean="0"/>
-              <a:t>3/2/2021</a:t>
+              <a:t>3/23/2021</a:t>
             </a:fld>
             <a:endParaRPr lang="en-US"/>
           </a:p>
@@ -1722,7 +1727,7 @@
           <a:p>
             <a:fld id="{F2D74960-CDA5-441E-9A34-72182268859C}" type="datetimeFigureOut">
               <a:rPr lang="en-US" smtClean="0"/>
-              <a:t>3/2/2021</a:t>
+              <a:t>3/23/2021</a:t>
             </a:fld>
             <a:endParaRPr lang="en-US"/>
           </a:p>
@@ -1817,7 +1822,7 @@
           <a:p>
             <a:fld id="{F2D74960-CDA5-441E-9A34-72182268859C}" type="datetimeFigureOut">
               <a:rPr lang="en-US" smtClean="0"/>
-              <a:t>3/2/2021</a:t>
+              <a:t>3/23/2021</a:t>
             </a:fld>
             <a:endParaRPr lang="en-US"/>
           </a:p>
@@ -2094,7 +2099,7 @@
           <a:p>
             <a:fld id="{F2D74960-CDA5-441E-9A34-72182268859C}" type="datetimeFigureOut">
               <a:rPr lang="en-US" smtClean="0"/>
-              <a:t>3/2/2021</a:t>
+              <a:t>3/23/2021</a:t>
             </a:fld>
             <a:endParaRPr lang="en-US"/>
           </a:p>
@@ -2351,7 +2356,7 @@
           <a:p>
             <a:fld id="{F2D74960-CDA5-441E-9A34-72182268859C}" type="datetimeFigureOut">
               <a:rPr lang="en-US" smtClean="0"/>
-              <a:t>3/2/2021</a:t>
+              <a:t>3/23/2021</a:t>
             </a:fld>
             <a:endParaRPr lang="en-US"/>
           </a:p>
@@ -2564,7 +2569,7 @@
           <a:p>
             <a:fld id="{F2D74960-CDA5-441E-9A34-72182268859C}" type="datetimeFigureOut">
               <a:rPr lang="en-US" smtClean="0"/>
-              <a:t>3/2/2021</a:t>
+              <a:t>3/23/2021</a:t>
             </a:fld>
             <a:endParaRPr lang="en-US"/>
           </a:p>
@@ -2971,6 +2976,52 @@
       </p:grpSpPr>
       <p:cxnSp>
         <p:nvCxnSpPr>
+          <p:cNvPr id="39" name="Straight Arrow Connector 38">
+            <a:extLst>
+              <a:ext uri="{FF2B5EF4-FFF2-40B4-BE49-F238E27FC236}">
+                <a16:creationId xmlns:a16="http://schemas.microsoft.com/office/drawing/2014/main" id="{53C0E3DE-AE3B-482C-9772-1C62347502F9}"/>
+              </a:ext>
+            </a:extLst>
+          </p:cNvPr>
+          <p:cNvCxnSpPr>
+            <a:cxnSpLocks/>
+            <a:stCxn id="11" idx="2"/>
+            <a:endCxn id="58" idx="0"/>
+          </p:cNvCxnSpPr>
+          <p:nvPr/>
+        </p:nvCxnSpPr>
+        <p:spPr>
+          <a:xfrm>
+            <a:off x="17463720" y="1567412"/>
+            <a:ext cx="2143330" cy="2756966"/>
+          </a:xfrm>
+          <a:prstGeom prst="straightConnector1">
+            <a:avLst/>
+          </a:prstGeom>
+          <a:ln w="38100">
+            <a:solidFill>
+              <a:schemeClr val="tx1"/>
+            </a:solidFill>
+            <a:tailEnd type="triangle"/>
+          </a:ln>
+        </p:spPr>
+        <p:style>
+          <a:lnRef idx="1">
+            <a:schemeClr val="accent1"/>
+          </a:lnRef>
+          <a:fillRef idx="0">
+            <a:schemeClr val="accent1"/>
+          </a:fillRef>
+          <a:effectRef idx="0">
+            <a:schemeClr val="accent1"/>
+          </a:effectRef>
+          <a:fontRef idx="minor">
+            <a:schemeClr val="tx1"/>
+          </a:fontRef>
+        </p:style>
+      </p:cxnSp>
+      <p:cxnSp>
+        <p:nvCxnSpPr>
           <p:cNvPr id="118" name="Straight Arrow Connector 117">
             <a:extLst>
               <a:ext uri="{FF2B5EF4-FFF2-40B4-BE49-F238E27FC236}">
@@ -3288,7 +3339,7 @@
             <a:pPr algn="ctr"/>
             <a:r>
               <a:rPr lang="en-US" sz="1600" dirty="0"/>
-              <a:t>Theorem 1: Every polyhedral L embeds a discrete loss</a:t>
+              <a:t>Theorem 2: Every polyhedral L embeds a discrete loss</a:t>
             </a:r>
           </a:p>
         </p:txBody>
@@ -3337,7 +3388,7 @@
             <a:pPr algn="ctr"/>
             <a:r>
               <a:rPr lang="en-US" sz="1600" dirty="0"/>
-              <a:t>Theorem 2: Every discrete ell embedded by polyhedral loss</a:t>
+              <a:t>Theorem 3: Every discrete ell embedded by polyhedral loss</a:t>
             </a:r>
           </a:p>
         </p:txBody>
@@ -3409,7 +3460,7 @@
             <a:avLst/>
           </a:prstGeom>
           <a:solidFill>
-            <a:schemeClr val="accent4"/>
+            <a:schemeClr val="accent1"/>
           </a:solidFill>
           <a:ln>
             <a:noFill/>
@@ -3438,7 +3489,7 @@
             <a:pPr algn="ctr"/>
             <a:r>
               <a:rPr lang="en-US" sz="1600" dirty="0"/>
-              <a:t>Theorem 6: A cell complex is affinely equivalent to a convex polyhedron if and only if it is a power diagram. </a:t>
+              <a:t>Theorem 1: A cell complex is affinely equivalent to a convex polyhedron if and only if it is a power diagram. </a:t>
             </a:r>
           </a:p>
         </p:txBody>
@@ -3647,7 +3698,7 @@
             <a:avLst/>
           </a:prstGeom>
           <a:solidFill>
-            <a:schemeClr val="accent2"/>
+            <a:schemeClr val="accent1"/>
           </a:solidFill>
           <a:ln>
             <a:noFill/>
@@ -3676,7 +3727,7 @@
             <a:pPr algn="ctr"/>
             <a:r>
               <a:rPr lang="en-US" sz="1600" dirty="0"/>
-              <a:t>Lemma 7: L polyhedral implies </a:t>
+              <a:t>Lemma 4: L polyhedral implies </a:t>
             </a:r>
             <a:r>
               <a:rPr lang="en-US" sz="1600" u="sng" dirty="0"/>
@@ -3756,7 +3807,7 @@
             <a:avLst/>
           </a:prstGeom>
           <a:solidFill>
-            <a:schemeClr val="accent2"/>
+            <a:schemeClr val="accent1"/>
           </a:solidFill>
           <a:ln>
             <a:noFill/>
@@ -3785,7 +3836,7 @@
             <a:pPr algn="ctr"/>
             <a:r>
               <a:rPr lang="en-US" sz="1600" dirty="0"/>
-              <a:t>Lemma 6: Range of (property elicited by polyhedral loss) is finite set of closed </a:t>
+              <a:t>Lemma 3: Range of (property elicited by polyhedral loss) is finite set of closed </a:t>
             </a:r>
             <a:r>
               <a:rPr lang="en-US" sz="1600" dirty="0" err="1"/>
@@ -3862,7 +3913,7 @@
             <a:avLst/>
           </a:prstGeom>
           <a:solidFill>
-            <a:schemeClr val="accent4"/>
+            <a:schemeClr val="accent1"/>
           </a:solidFill>
           <a:ln>
             <a:noFill/>
@@ -3891,7 +3942,7 @@
             <a:pPr algn="ctr"/>
             <a:r>
               <a:rPr lang="en-US" sz="1600" dirty="0"/>
-              <a:t>Lemma 5: Power diagram induced by (full support) convex combination of polyhedral  functions is same</a:t>
+              <a:t>Lemma 2: Power diagram induced by (full support) convex combination of polyhedral  functions is same</a:t>
             </a:r>
           </a:p>
         </p:txBody>
@@ -4084,7 +4135,7 @@
             <a:pPr algn="ctr"/>
             <a:r>
               <a:rPr lang="en-US" sz="1600" dirty="0"/>
-              <a:t>Lemma 3: Negative Bayes risk is polyhedral and projection forms power diagram</a:t>
+              <a:t>Lemma 6: Negative Bayes risk is polyhedral and projection forms power diagram</a:t>
             </a:r>
           </a:p>
         </p:txBody>
@@ -4185,7 +4236,7 @@
             <a:pPr algn="ctr"/>
             <a:r>
               <a:rPr lang="en-US" sz="1600" dirty="0"/>
-              <a:t>Lemma 4:Embedding property implies level sets are same up to trim</a:t>
+              <a:t>Lemma 7:Embedding property implies level sets are same up to trim</a:t>
             </a:r>
           </a:p>
         </p:txBody>
@@ -4332,7 +4383,7 @@
             <a:pPr algn="ctr"/>
             <a:r>
               <a:rPr lang="en-US" sz="1600" dirty="0"/>
-              <a:t>Lemma 2: property embedding implies loss embedding</a:t>
+              <a:t>Lemma 5: property embedding implies loss embedding</a:t>
             </a:r>
           </a:p>
         </p:txBody>
@@ -4488,7 +4539,7 @@
             <a:pPr algn="ctr"/>
             <a:r>
               <a:rPr lang="en-US" sz="1600" dirty="0"/>
-              <a:t>Theorem 3: Poly loss embeds finite prop. Moreover, poly loss indirectly elicits prop </a:t>
+              <a:t>Theorem 5: Poly loss embeds finite prop. Moreover, poly loss indirectly elicits prop </a:t>
             </a:r>
             <a:r>
               <a:rPr lang="en-US" sz="1600" dirty="0" err="1"/>
@@ -4597,7 +4648,7 @@
             <a:pPr algn="ctr"/>
             <a:r>
               <a:rPr lang="en-US" sz="1600" dirty="0"/>
-              <a:t>Theorem 4: Poly loss indirectly elicits implies consistent</a:t>
+              <a:t>Theorem 6: Poly loss indirectly elicits implies consistent</a:t>
             </a:r>
           </a:p>
         </p:txBody>
@@ -4698,7 +4749,7 @@
             <a:pPr algn="ctr"/>
             <a:r>
               <a:rPr lang="en-US" sz="1600" dirty="0"/>
-              <a:t>Theorem 5: Embedding implies calibration</a:t>
+              <a:t>Theorem 4: Embedding implies calibration</a:t>
             </a:r>
           </a:p>
         </p:txBody>
@@ -4795,6 +4846,160 @@
           </a:fontRef>
         </p:style>
       </p:cxnSp>
+      <p:sp>
+        <p:nvSpPr>
+          <p:cNvPr id="2" name="Cross 1">
+            <a:extLst>
+              <a:ext uri="{FF2B5EF4-FFF2-40B4-BE49-F238E27FC236}">
+                <a16:creationId xmlns:a16="http://schemas.microsoft.com/office/drawing/2014/main" id="{A7FB155A-6B34-4881-8876-1DB805BA6647}"/>
+              </a:ext>
+            </a:extLst>
+          </p:cNvPr>
+          <p:cNvSpPr/>
+          <p:nvPr/>
+        </p:nvSpPr>
+        <p:spPr>
+          <a:xfrm rot="3060572">
+            <a:off x="12617397" y="4764984"/>
+            <a:ext cx="2436320" cy="2452682"/>
+          </a:xfrm>
+          <a:prstGeom prst="plus">
+            <a:avLst>
+              <a:gd name="adj" fmla="val 43306"/>
+            </a:avLst>
+          </a:prstGeom>
+          <a:solidFill>
+            <a:srgbClr val="FF0000"/>
+          </a:solidFill>
+          <a:ln>
+            <a:noFill/>
+          </a:ln>
+        </p:spPr>
+        <p:style>
+          <a:lnRef idx="2">
+            <a:schemeClr val="accent1">
+              <a:shade val="50000"/>
+            </a:schemeClr>
+          </a:lnRef>
+          <a:fillRef idx="1">
+            <a:schemeClr val="accent1"/>
+          </a:fillRef>
+          <a:effectRef idx="0">
+            <a:schemeClr val="accent1"/>
+          </a:effectRef>
+          <a:fontRef idx="minor">
+            <a:schemeClr val="lt1"/>
+          </a:fontRef>
+        </p:style>
+        <p:txBody>
+          <a:bodyPr rtlCol="0" anchor="ctr"/>
+          <a:lstStyle/>
+          <a:p>
+            <a:pPr algn="ctr"/>
+            <a:endParaRPr lang="en-US"/>
+          </a:p>
+        </p:txBody>
+      </p:sp>
+      <p:cxnSp>
+        <p:nvCxnSpPr>
+          <p:cNvPr id="42" name="Straight Arrow Connector 41">
+            <a:extLst>
+              <a:ext uri="{FF2B5EF4-FFF2-40B4-BE49-F238E27FC236}">
+                <a16:creationId xmlns:a16="http://schemas.microsoft.com/office/drawing/2014/main" id="{9B2E0340-93F6-4B61-8675-5453AB5BE8A9}"/>
+              </a:ext>
+            </a:extLst>
+          </p:cNvPr>
+          <p:cNvCxnSpPr>
+            <a:cxnSpLocks/>
+            <a:stCxn id="11" idx="2"/>
+            <a:endCxn id="7" idx="0"/>
+          </p:cNvCxnSpPr>
+          <p:nvPr/>
+        </p:nvCxnSpPr>
+        <p:spPr>
+          <a:xfrm flipH="1">
+            <a:off x="16987451" y="1567412"/>
+            <a:ext cx="476269" cy="7396936"/>
+          </a:xfrm>
+          <a:prstGeom prst="straightConnector1">
+            <a:avLst/>
+          </a:prstGeom>
+          <a:ln w="38100">
+            <a:solidFill>
+              <a:schemeClr val="tx1"/>
+            </a:solidFill>
+            <a:tailEnd type="triangle"/>
+          </a:ln>
+        </p:spPr>
+        <p:style>
+          <a:lnRef idx="1">
+            <a:schemeClr val="accent1"/>
+          </a:lnRef>
+          <a:fillRef idx="0">
+            <a:schemeClr val="accent1"/>
+          </a:fillRef>
+          <a:effectRef idx="0">
+            <a:schemeClr val="accent1"/>
+          </a:effectRef>
+          <a:fontRef idx="minor">
+            <a:schemeClr val="tx1"/>
+          </a:fontRef>
+        </p:style>
+      </p:cxnSp>
+      <p:sp>
+        <p:nvSpPr>
+          <p:cNvPr id="45" name="Cross 44">
+            <a:extLst>
+              <a:ext uri="{FF2B5EF4-FFF2-40B4-BE49-F238E27FC236}">
+                <a16:creationId xmlns:a16="http://schemas.microsoft.com/office/drawing/2014/main" id="{1782B08A-A540-4B84-A231-D96FC676368D}"/>
+              </a:ext>
+            </a:extLst>
+          </p:cNvPr>
+          <p:cNvSpPr/>
+          <p:nvPr/>
+        </p:nvSpPr>
+        <p:spPr>
+          <a:xfrm rot="3060572">
+            <a:off x="14786923" y="7135697"/>
+            <a:ext cx="1359561" cy="1471066"/>
+          </a:xfrm>
+          <a:prstGeom prst="plus">
+            <a:avLst>
+              <a:gd name="adj" fmla="val 43306"/>
+            </a:avLst>
+          </a:prstGeom>
+          <a:solidFill>
+            <a:srgbClr val="FF0000"/>
+          </a:solidFill>
+          <a:ln>
+            <a:noFill/>
+          </a:ln>
+        </p:spPr>
+        <p:style>
+          <a:lnRef idx="2">
+            <a:schemeClr val="accent1">
+              <a:shade val="50000"/>
+            </a:schemeClr>
+          </a:lnRef>
+          <a:fillRef idx="1">
+            <a:schemeClr val="accent1"/>
+          </a:fillRef>
+          <a:effectRef idx="0">
+            <a:schemeClr val="accent1"/>
+          </a:effectRef>
+          <a:fontRef idx="minor">
+            <a:schemeClr val="lt1"/>
+          </a:fontRef>
+        </p:style>
+        <p:txBody>
+          <a:bodyPr rtlCol="0" anchor="ctr"/>
+          <a:lstStyle/>
+          <a:p>
+            <a:pPr algn="ctr"/>
+            <a:endParaRPr lang="en-US"/>
+          </a:p>
+        </p:txBody>
+      </p:sp>
     </p:spTree>
     <p:extLst>
       <p:ext uri="{BB962C8B-B14F-4D97-AF65-F5344CB8AC3E}">
@@ -4998,7 +5203,7 @@
         </p:nvSpPr>
         <p:spPr>
           <a:xfrm>
-            <a:off x="2194560" y="2318841"/>
+            <a:off x="2194560" y="4062580"/>
             <a:ext cx="4355096" cy="1198882"/>
           </a:xfrm>
           <a:prstGeom prst="roundRect">
@@ -5034,7 +5239,7 @@
             <a:pPr algn="ctr"/>
             <a:r>
               <a:rPr lang="en-US" sz="1600" dirty="0"/>
-              <a:t>Section 4: Embedding Properties (rename)</a:t>
+              <a:t>Section 5: Embedding Properties (rename)</a:t>
             </a:r>
           </a:p>
         </p:txBody>
@@ -5053,7 +5258,7 @@
         </p:nvSpPr>
         <p:spPr>
           <a:xfrm>
-            <a:off x="2194560" y="4062580"/>
+            <a:off x="2194560" y="2318841"/>
             <a:ext cx="4355096" cy="1198882"/>
           </a:xfrm>
           <a:prstGeom prst="roundRect">
@@ -5089,7 +5294,7 @@
             <a:pPr algn="ctr"/>
             <a:r>
               <a:rPr lang="en-US" sz="1600" dirty="0"/>
-              <a:t>Section 5: Consistency via Calibrated links</a:t>
+              <a:t>Section 4: Consistency via Calibrated links</a:t>
             </a:r>
           </a:p>
         </p:txBody>

</xml_diff>

<commit_message>
Adding clustered dependency graph to iron out authentication things
</commit_message>
<xml_diff>
--- a/poly-embed-journal/storyboarding/dependency-graph-result.pptx
+++ b/poly-embed-journal/storyboarding/dependency-graph-result.pptx
@@ -2,13 +2,14 @@
 <file path=ppt/presentation.xml><?xml version="1.0" encoding="utf-8"?>
 <p:presentation xmlns:a="http://schemas.openxmlformats.org/drawingml/2006/main" xmlns:r="http://schemas.openxmlformats.org/officeDocument/2006/relationships" xmlns:p="http://schemas.openxmlformats.org/presentationml/2006/main" saveSubsetFonts="1">
   <p:sldMasterIdLst>
-    <p:sldMasterId id="2147483660" r:id="rId1"/>
+    <p:sldMasterId id="2147483672" r:id="rId1"/>
   </p:sldMasterIdLst>
   <p:sldIdLst>
     <p:sldId id="256" r:id="rId2"/>
-    <p:sldId id="257" r:id="rId3"/>
+    <p:sldId id="258" r:id="rId3"/>
+    <p:sldId id="257" r:id="rId4"/>
   </p:sldIdLst>
-  <p:sldSz cx="24384000" cy="13716000"/>
+  <p:sldSz cx="13716000" cy="24384000"/>
   <p:notesSz cx="6858000" cy="9144000"/>
   <p:defaultTextStyle>
     <a:defPPr>
@@ -142,15 +143,15 @@
         </p:nvSpPr>
         <p:spPr>
           <a:xfrm>
-            <a:off x="3048000" y="2244726"/>
-            <a:ext cx="18288000" cy="4775200"/>
+            <a:off x="1028700" y="3990624"/>
+            <a:ext cx="11658600" cy="8489244"/>
           </a:xfrm>
         </p:spPr>
         <p:txBody>
           <a:bodyPr anchor="b"/>
           <a:lstStyle>
             <a:lvl1pPr algn="ctr">
-              <a:defRPr sz="12000"/>
+              <a:defRPr sz="9000"/>
             </a:lvl1pPr>
           </a:lstStyle>
           <a:p>
@@ -174,8 +175,8 @@
         </p:nvSpPr>
         <p:spPr>
           <a:xfrm>
-            <a:off x="3048000" y="7204076"/>
-            <a:ext cx="18288000" cy="3311524"/>
+            <a:off x="1714500" y="12807246"/>
+            <a:ext cx="10287000" cy="5887154"/>
           </a:xfrm>
         </p:spPr>
         <p:txBody>
@@ -183,39 +184,39 @@
           <a:lstStyle>
             <a:lvl1pPr marL="0" indent="0" algn="ctr">
               <a:buNone/>
-              <a:defRPr sz="4800"/>
+              <a:defRPr sz="3600"/>
             </a:lvl1pPr>
-            <a:lvl2pPr marL="914400" indent="0" algn="ctr">
+            <a:lvl2pPr marL="685800" indent="0" algn="ctr">
               <a:buNone/>
-              <a:defRPr sz="4000"/>
+              <a:defRPr sz="3000"/>
             </a:lvl2pPr>
-            <a:lvl3pPr marL="1828800" indent="0" algn="ctr">
+            <a:lvl3pPr marL="1371600" indent="0" algn="ctr">
               <a:buNone/>
-              <a:defRPr sz="3600"/>
+              <a:defRPr sz="2700"/>
             </a:lvl3pPr>
-            <a:lvl4pPr marL="2743200" indent="0" algn="ctr">
+            <a:lvl4pPr marL="2057400" indent="0" algn="ctr">
               <a:buNone/>
-              <a:defRPr sz="3200"/>
+              <a:defRPr sz="2400"/>
             </a:lvl4pPr>
-            <a:lvl5pPr marL="3657600" indent="0" algn="ctr">
+            <a:lvl5pPr marL="2743200" indent="0" algn="ctr">
               <a:buNone/>
-              <a:defRPr sz="3200"/>
+              <a:defRPr sz="2400"/>
             </a:lvl5pPr>
-            <a:lvl6pPr marL="4572000" indent="0" algn="ctr">
+            <a:lvl6pPr marL="3429000" indent="0" algn="ctr">
               <a:buNone/>
-              <a:defRPr sz="3200"/>
+              <a:defRPr sz="2400"/>
             </a:lvl6pPr>
-            <a:lvl7pPr marL="5486400" indent="0" algn="ctr">
+            <a:lvl7pPr marL="4114800" indent="0" algn="ctr">
               <a:buNone/>
-              <a:defRPr sz="3200"/>
+              <a:defRPr sz="2400"/>
             </a:lvl7pPr>
-            <a:lvl8pPr marL="6400800" indent="0" algn="ctr">
+            <a:lvl8pPr marL="4800600" indent="0" algn="ctr">
               <a:buNone/>
-              <a:defRPr sz="3200"/>
+              <a:defRPr sz="2400"/>
             </a:lvl8pPr>
-            <a:lvl9pPr marL="7315200" indent="0" algn="ctr">
+            <a:lvl9pPr marL="5486400" indent="0" algn="ctr">
               <a:buNone/>
-              <a:defRPr sz="3200"/>
+              <a:defRPr sz="2400"/>
             </a:lvl9pPr>
           </a:lstStyle>
           <a:p>
@@ -295,7 +296,7 @@
     </p:spTree>
     <p:extLst>
       <p:ext uri="{BB962C8B-B14F-4D97-AF65-F5344CB8AC3E}">
-        <p14:creationId xmlns:p14="http://schemas.microsoft.com/office/powerpoint/2010/main" val="3763946038"/>
+        <p14:creationId xmlns:p14="http://schemas.microsoft.com/office/powerpoint/2010/main" val="2023838167"/>
       </p:ext>
     </p:extLst>
   </p:cSld>
@@ -465,7 +466,7 @@
     </p:spTree>
     <p:extLst>
       <p:ext uri="{BB962C8B-B14F-4D97-AF65-F5344CB8AC3E}">
-        <p14:creationId xmlns:p14="http://schemas.microsoft.com/office/powerpoint/2010/main" val="3307259985"/>
+        <p14:creationId xmlns:p14="http://schemas.microsoft.com/office/powerpoint/2010/main" val="615501218"/>
       </p:ext>
     </p:extLst>
   </p:cSld>
@@ -504,8 +505,8 @@
         </p:nvSpPr>
         <p:spPr>
           <a:xfrm>
-            <a:off x="17449800" y="730250"/>
-            <a:ext cx="5257800" cy="11623676"/>
+            <a:off x="9815513" y="1298222"/>
+            <a:ext cx="2957513" cy="20664313"/>
           </a:xfrm>
         </p:spPr>
         <p:txBody>
@@ -532,8 +533,8 @@
         </p:nvSpPr>
         <p:spPr>
           <a:xfrm>
-            <a:off x="1676400" y="730250"/>
-            <a:ext cx="15468600" cy="11623676"/>
+            <a:off x="942976" y="1298222"/>
+            <a:ext cx="8701088" cy="20664313"/>
           </a:xfrm>
         </p:spPr>
         <p:txBody>
@@ -645,7 +646,7 @@
     </p:spTree>
     <p:extLst>
       <p:ext uri="{BB962C8B-B14F-4D97-AF65-F5344CB8AC3E}">
-        <p14:creationId xmlns:p14="http://schemas.microsoft.com/office/powerpoint/2010/main" val="2022492367"/>
+        <p14:creationId xmlns:p14="http://schemas.microsoft.com/office/powerpoint/2010/main" val="3772563456"/>
       </p:ext>
     </p:extLst>
   </p:cSld>
@@ -815,7 +816,7 @@
     </p:spTree>
     <p:extLst>
       <p:ext uri="{BB962C8B-B14F-4D97-AF65-F5344CB8AC3E}">
-        <p14:creationId xmlns:p14="http://schemas.microsoft.com/office/powerpoint/2010/main" val="591229375"/>
+        <p14:creationId xmlns:p14="http://schemas.microsoft.com/office/powerpoint/2010/main" val="2745626721"/>
       </p:ext>
     </p:extLst>
   </p:cSld>
@@ -854,15 +855,15 @@
         </p:nvSpPr>
         <p:spPr>
           <a:xfrm>
-            <a:off x="1663700" y="3419477"/>
-            <a:ext cx="21031200" cy="5705474"/>
+            <a:off x="935832" y="6079074"/>
+            <a:ext cx="11830050" cy="10143065"/>
           </a:xfrm>
         </p:spPr>
         <p:txBody>
           <a:bodyPr anchor="b"/>
           <a:lstStyle>
             <a:lvl1pPr>
-              <a:defRPr sz="12000"/>
+              <a:defRPr sz="9000"/>
             </a:lvl1pPr>
           </a:lstStyle>
           <a:p>
@@ -886,8 +887,8 @@
         </p:nvSpPr>
         <p:spPr>
           <a:xfrm>
-            <a:off x="1663700" y="9178927"/>
-            <a:ext cx="21031200" cy="3000374"/>
+            <a:off x="935832" y="16318096"/>
+            <a:ext cx="11830050" cy="5333998"/>
           </a:xfrm>
         </p:spPr>
         <p:txBody>
@@ -895,17 +896,15 @@
           <a:lstStyle>
             <a:lvl1pPr marL="0" indent="0">
               <a:buNone/>
-              <a:defRPr sz="4800">
+              <a:defRPr sz="3600">
                 <a:solidFill>
-                  <a:schemeClr val="tx1">
-                    <a:tint val="75000"/>
-                  </a:schemeClr>
+                  <a:schemeClr val="tx1"/>
                 </a:solidFill>
               </a:defRPr>
             </a:lvl1pPr>
-            <a:lvl2pPr marL="914400" indent="0">
+            <a:lvl2pPr marL="685800" indent="0">
               <a:buNone/>
-              <a:defRPr sz="4000">
+              <a:defRPr sz="3000">
                 <a:solidFill>
                   <a:schemeClr val="tx1">
                     <a:tint val="75000"/>
@@ -913,9 +912,9 @@
                 </a:solidFill>
               </a:defRPr>
             </a:lvl2pPr>
-            <a:lvl3pPr marL="1828800" indent="0">
+            <a:lvl3pPr marL="1371600" indent="0">
               <a:buNone/>
-              <a:defRPr sz="3600">
+              <a:defRPr sz="2700">
                 <a:solidFill>
                   <a:schemeClr val="tx1">
                     <a:tint val="75000"/>
@@ -923,9 +922,9 @@
                 </a:solidFill>
               </a:defRPr>
             </a:lvl3pPr>
-            <a:lvl4pPr marL="2743200" indent="0">
+            <a:lvl4pPr marL="2057400" indent="0">
               <a:buNone/>
-              <a:defRPr sz="3200">
+              <a:defRPr sz="2400">
                 <a:solidFill>
                   <a:schemeClr val="tx1">
                     <a:tint val="75000"/>
@@ -933,9 +932,9 @@
                 </a:solidFill>
               </a:defRPr>
             </a:lvl4pPr>
-            <a:lvl5pPr marL="3657600" indent="0">
+            <a:lvl5pPr marL="2743200" indent="0">
               <a:buNone/>
-              <a:defRPr sz="3200">
+              <a:defRPr sz="2400">
                 <a:solidFill>
                   <a:schemeClr val="tx1">
                     <a:tint val="75000"/>
@@ -943,9 +942,9 @@
                 </a:solidFill>
               </a:defRPr>
             </a:lvl5pPr>
-            <a:lvl6pPr marL="4572000" indent="0">
+            <a:lvl6pPr marL="3429000" indent="0">
               <a:buNone/>
-              <a:defRPr sz="3200">
+              <a:defRPr sz="2400">
                 <a:solidFill>
                   <a:schemeClr val="tx1">
                     <a:tint val="75000"/>
@@ -953,9 +952,9 @@
                 </a:solidFill>
               </a:defRPr>
             </a:lvl6pPr>
-            <a:lvl7pPr marL="5486400" indent="0">
+            <a:lvl7pPr marL="4114800" indent="0">
               <a:buNone/>
-              <a:defRPr sz="3200">
+              <a:defRPr sz="2400">
                 <a:solidFill>
                   <a:schemeClr val="tx1">
                     <a:tint val="75000"/>
@@ -963,9 +962,9 @@
                 </a:solidFill>
               </a:defRPr>
             </a:lvl7pPr>
-            <a:lvl8pPr marL="6400800" indent="0">
+            <a:lvl8pPr marL="4800600" indent="0">
               <a:buNone/>
-              <a:defRPr sz="3200">
+              <a:defRPr sz="2400">
                 <a:solidFill>
                   <a:schemeClr val="tx1">
                     <a:tint val="75000"/>
@@ -973,9 +972,9 @@
                 </a:solidFill>
               </a:defRPr>
             </a:lvl8pPr>
-            <a:lvl9pPr marL="7315200" indent="0">
+            <a:lvl9pPr marL="5486400" indent="0">
               <a:buNone/>
-              <a:defRPr sz="3200">
+              <a:defRPr sz="2400">
                 <a:solidFill>
                   <a:schemeClr val="tx1">
                     <a:tint val="75000"/>
@@ -1061,7 +1060,7 @@
     </p:spTree>
     <p:extLst>
       <p:ext uri="{BB962C8B-B14F-4D97-AF65-F5344CB8AC3E}">
-        <p14:creationId xmlns:p14="http://schemas.microsoft.com/office/powerpoint/2010/main" val="1117701211"/>
+        <p14:creationId xmlns:p14="http://schemas.microsoft.com/office/powerpoint/2010/main" val="1519106148"/>
       </p:ext>
     </p:extLst>
   </p:cSld>
@@ -1123,8 +1122,8 @@
         </p:nvSpPr>
         <p:spPr>
           <a:xfrm>
-            <a:off x="1676400" y="3651250"/>
-            <a:ext cx="10363200" cy="8702676"/>
+            <a:off x="942975" y="6491111"/>
+            <a:ext cx="5829300" cy="15471424"/>
           </a:xfrm>
         </p:spPr>
         <p:txBody>
@@ -1180,8 +1179,8 @@
         </p:nvSpPr>
         <p:spPr>
           <a:xfrm>
-            <a:off x="12344400" y="3651250"/>
-            <a:ext cx="10363200" cy="8702676"/>
+            <a:off x="6943725" y="6491111"/>
+            <a:ext cx="5829300" cy="15471424"/>
           </a:xfrm>
         </p:spPr>
         <p:txBody>
@@ -1293,7 +1292,7 @@
     </p:spTree>
     <p:extLst>
       <p:ext uri="{BB962C8B-B14F-4D97-AF65-F5344CB8AC3E}">
-        <p14:creationId xmlns:p14="http://schemas.microsoft.com/office/powerpoint/2010/main" val="2413585972"/>
+        <p14:creationId xmlns:p14="http://schemas.microsoft.com/office/powerpoint/2010/main" val="94468686"/>
       </p:ext>
     </p:extLst>
   </p:cSld>
@@ -1332,8 +1331,8 @@
         </p:nvSpPr>
         <p:spPr>
           <a:xfrm>
-            <a:off x="1679576" y="730251"/>
-            <a:ext cx="21031200" cy="2651126"/>
+            <a:off x="944762" y="1298228"/>
+            <a:ext cx="11830050" cy="4713113"/>
           </a:xfrm>
         </p:spPr>
         <p:txBody>
@@ -1360,8 +1359,8 @@
         </p:nvSpPr>
         <p:spPr>
           <a:xfrm>
-            <a:off x="1679577" y="3362326"/>
-            <a:ext cx="10315574" cy="1647824"/>
+            <a:off x="944763" y="5977468"/>
+            <a:ext cx="5802510" cy="2929465"/>
           </a:xfrm>
         </p:spPr>
         <p:txBody>
@@ -1369,39 +1368,39 @@
           <a:lstStyle>
             <a:lvl1pPr marL="0" indent="0">
               <a:buNone/>
-              <a:defRPr sz="4800" b="1"/>
+              <a:defRPr sz="3600" b="1"/>
             </a:lvl1pPr>
-            <a:lvl2pPr marL="914400" indent="0">
+            <a:lvl2pPr marL="685800" indent="0">
               <a:buNone/>
-              <a:defRPr sz="4000" b="1"/>
+              <a:defRPr sz="3000" b="1"/>
             </a:lvl2pPr>
-            <a:lvl3pPr marL="1828800" indent="0">
+            <a:lvl3pPr marL="1371600" indent="0">
               <a:buNone/>
-              <a:defRPr sz="3600" b="1"/>
+              <a:defRPr sz="2700" b="1"/>
             </a:lvl3pPr>
-            <a:lvl4pPr marL="2743200" indent="0">
+            <a:lvl4pPr marL="2057400" indent="0">
               <a:buNone/>
-              <a:defRPr sz="3200" b="1"/>
+              <a:defRPr sz="2400" b="1"/>
             </a:lvl4pPr>
-            <a:lvl5pPr marL="3657600" indent="0">
+            <a:lvl5pPr marL="2743200" indent="0">
               <a:buNone/>
-              <a:defRPr sz="3200" b="1"/>
+              <a:defRPr sz="2400" b="1"/>
             </a:lvl5pPr>
-            <a:lvl6pPr marL="4572000" indent="0">
+            <a:lvl6pPr marL="3429000" indent="0">
               <a:buNone/>
-              <a:defRPr sz="3200" b="1"/>
+              <a:defRPr sz="2400" b="1"/>
             </a:lvl6pPr>
-            <a:lvl7pPr marL="5486400" indent="0">
+            <a:lvl7pPr marL="4114800" indent="0">
               <a:buNone/>
-              <a:defRPr sz="3200" b="1"/>
+              <a:defRPr sz="2400" b="1"/>
             </a:lvl7pPr>
-            <a:lvl8pPr marL="6400800" indent="0">
+            <a:lvl8pPr marL="4800600" indent="0">
               <a:buNone/>
-              <a:defRPr sz="3200" b="1"/>
+              <a:defRPr sz="2400" b="1"/>
             </a:lvl8pPr>
-            <a:lvl9pPr marL="7315200" indent="0">
+            <a:lvl9pPr marL="5486400" indent="0">
               <a:buNone/>
-              <a:defRPr sz="3200" b="1"/>
+              <a:defRPr sz="2400" b="1"/>
             </a:lvl9pPr>
           </a:lstStyle>
           <a:p>
@@ -1425,8 +1424,8 @@
         </p:nvSpPr>
         <p:spPr>
           <a:xfrm>
-            <a:off x="1679577" y="5010150"/>
-            <a:ext cx="10315574" cy="7369176"/>
+            <a:off x="944763" y="8906934"/>
+            <a:ext cx="5802510" cy="13100757"/>
           </a:xfrm>
         </p:spPr>
         <p:txBody>
@@ -1482,8 +1481,8 @@
         </p:nvSpPr>
         <p:spPr>
           <a:xfrm>
-            <a:off x="12344400" y="3362326"/>
-            <a:ext cx="10366376" cy="1647824"/>
+            <a:off x="6943726" y="5977468"/>
+            <a:ext cx="5831087" cy="2929465"/>
           </a:xfrm>
         </p:spPr>
         <p:txBody>
@@ -1491,39 +1490,39 @@
           <a:lstStyle>
             <a:lvl1pPr marL="0" indent="0">
               <a:buNone/>
-              <a:defRPr sz="4800" b="1"/>
+              <a:defRPr sz="3600" b="1"/>
             </a:lvl1pPr>
-            <a:lvl2pPr marL="914400" indent="0">
+            <a:lvl2pPr marL="685800" indent="0">
               <a:buNone/>
-              <a:defRPr sz="4000" b="1"/>
+              <a:defRPr sz="3000" b="1"/>
             </a:lvl2pPr>
-            <a:lvl3pPr marL="1828800" indent="0">
+            <a:lvl3pPr marL="1371600" indent="0">
               <a:buNone/>
-              <a:defRPr sz="3600" b="1"/>
+              <a:defRPr sz="2700" b="1"/>
             </a:lvl3pPr>
-            <a:lvl4pPr marL="2743200" indent="0">
+            <a:lvl4pPr marL="2057400" indent="0">
               <a:buNone/>
-              <a:defRPr sz="3200" b="1"/>
+              <a:defRPr sz="2400" b="1"/>
             </a:lvl4pPr>
-            <a:lvl5pPr marL="3657600" indent="0">
+            <a:lvl5pPr marL="2743200" indent="0">
               <a:buNone/>
-              <a:defRPr sz="3200" b="1"/>
+              <a:defRPr sz="2400" b="1"/>
             </a:lvl5pPr>
-            <a:lvl6pPr marL="4572000" indent="0">
+            <a:lvl6pPr marL="3429000" indent="0">
               <a:buNone/>
-              <a:defRPr sz="3200" b="1"/>
+              <a:defRPr sz="2400" b="1"/>
             </a:lvl6pPr>
-            <a:lvl7pPr marL="5486400" indent="0">
+            <a:lvl7pPr marL="4114800" indent="0">
               <a:buNone/>
-              <a:defRPr sz="3200" b="1"/>
+              <a:defRPr sz="2400" b="1"/>
             </a:lvl7pPr>
-            <a:lvl8pPr marL="6400800" indent="0">
+            <a:lvl8pPr marL="4800600" indent="0">
               <a:buNone/>
-              <a:defRPr sz="3200" b="1"/>
+              <a:defRPr sz="2400" b="1"/>
             </a:lvl8pPr>
-            <a:lvl9pPr marL="7315200" indent="0">
+            <a:lvl9pPr marL="5486400" indent="0">
               <a:buNone/>
-              <a:defRPr sz="3200" b="1"/>
+              <a:defRPr sz="2400" b="1"/>
             </a:lvl9pPr>
           </a:lstStyle>
           <a:p>
@@ -1547,8 +1546,8 @@
         </p:nvSpPr>
         <p:spPr>
           <a:xfrm>
-            <a:off x="12344400" y="5010150"/>
-            <a:ext cx="10366376" cy="7369176"/>
+            <a:off x="6943726" y="8906934"/>
+            <a:ext cx="5831087" cy="13100757"/>
           </a:xfrm>
         </p:spPr>
         <p:txBody>
@@ -1660,7 +1659,7 @@
     </p:spTree>
     <p:extLst>
       <p:ext uri="{BB962C8B-B14F-4D97-AF65-F5344CB8AC3E}">
-        <p14:creationId xmlns:p14="http://schemas.microsoft.com/office/powerpoint/2010/main" val="2894077033"/>
+        <p14:creationId xmlns:p14="http://schemas.microsoft.com/office/powerpoint/2010/main" val="4289162493"/>
       </p:ext>
     </p:extLst>
   </p:cSld>
@@ -1778,7 +1777,7 @@
     </p:spTree>
     <p:extLst>
       <p:ext uri="{BB962C8B-B14F-4D97-AF65-F5344CB8AC3E}">
-        <p14:creationId xmlns:p14="http://schemas.microsoft.com/office/powerpoint/2010/main" val="1585122183"/>
+        <p14:creationId xmlns:p14="http://schemas.microsoft.com/office/powerpoint/2010/main" val="2202242373"/>
       </p:ext>
     </p:extLst>
   </p:cSld>
@@ -1873,7 +1872,7 @@
     </p:spTree>
     <p:extLst>
       <p:ext uri="{BB962C8B-B14F-4D97-AF65-F5344CB8AC3E}">
-        <p14:creationId xmlns:p14="http://schemas.microsoft.com/office/powerpoint/2010/main" val="4079401917"/>
+        <p14:creationId xmlns:p14="http://schemas.microsoft.com/office/powerpoint/2010/main" val="3689340961"/>
       </p:ext>
     </p:extLst>
   </p:cSld>
@@ -1912,15 +1911,15 @@
         </p:nvSpPr>
         <p:spPr>
           <a:xfrm>
-            <a:off x="1679577" y="914400"/>
-            <a:ext cx="7864474" cy="3200400"/>
+            <a:off x="944762" y="1625600"/>
+            <a:ext cx="4423767" cy="5689600"/>
           </a:xfrm>
         </p:spPr>
         <p:txBody>
           <a:bodyPr anchor="b"/>
           <a:lstStyle>
             <a:lvl1pPr>
-              <a:defRPr sz="6400"/>
+              <a:defRPr sz="4800"/>
             </a:lvl1pPr>
           </a:lstStyle>
           <a:p>
@@ -1944,39 +1943,39 @@
         </p:nvSpPr>
         <p:spPr>
           <a:xfrm>
-            <a:off x="10366376" y="1974851"/>
-            <a:ext cx="12344400" cy="9747250"/>
+            <a:off x="5831087" y="3510850"/>
+            <a:ext cx="6943725" cy="17328444"/>
           </a:xfrm>
         </p:spPr>
         <p:txBody>
           <a:bodyPr/>
           <a:lstStyle>
             <a:lvl1pPr>
-              <a:defRPr sz="6400"/>
+              <a:defRPr sz="4800"/>
             </a:lvl1pPr>
             <a:lvl2pPr>
-              <a:defRPr sz="5600"/>
+              <a:defRPr sz="4200"/>
             </a:lvl2pPr>
             <a:lvl3pPr>
-              <a:defRPr sz="4800"/>
+              <a:defRPr sz="3600"/>
             </a:lvl3pPr>
             <a:lvl4pPr>
-              <a:defRPr sz="4000"/>
+              <a:defRPr sz="3000"/>
             </a:lvl4pPr>
             <a:lvl5pPr>
-              <a:defRPr sz="4000"/>
+              <a:defRPr sz="3000"/>
             </a:lvl5pPr>
             <a:lvl6pPr>
-              <a:defRPr sz="4000"/>
+              <a:defRPr sz="3000"/>
             </a:lvl6pPr>
             <a:lvl7pPr>
-              <a:defRPr sz="4000"/>
+              <a:defRPr sz="3000"/>
             </a:lvl7pPr>
             <a:lvl8pPr>
-              <a:defRPr sz="4000"/>
+              <a:defRPr sz="3000"/>
             </a:lvl8pPr>
             <a:lvl9pPr>
-              <a:defRPr sz="4000"/>
+              <a:defRPr sz="3000"/>
             </a:lvl9pPr>
           </a:lstStyle>
           <a:p>
@@ -2029,8 +2028,8 @@
         </p:nvSpPr>
         <p:spPr>
           <a:xfrm>
-            <a:off x="1679577" y="4114800"/>
-            <a:ext cx="7864474" cy="7623176"/>
+            <a:off x="944762" y="7315200"/>
+            <a:ext cx="4423767" cy="13552313"/>
           </a:xfrm>
         </p:spPr>
         <p:txBody>
@@ -2038,39 +2037,39 @@
           <a:lstStyle>
             <a:lvl1pPr marL="0" indent="0">
               <a:buNone/>
-              <a:defRPr sz="3200"/>
+              <a:defRPr sz="2400"/>
             </a:lvl1pPr>
-            <a:lvl2pPr marL="914400" indent="0">
+            <a:lvl2pPr marL="685800" indent="0">
               <a:buNone/>
-              <a:defRPr sz="2800"/>
+              <a:defRPr sz="2100"/>
             </a:lvl2pPr>
-            <a:lvl3pPr marL="1828800" indent="0">
+            <a:lvl3pPr marL="1371600" indent="0">
               <a:buNone/>
-              <a:defRPr sz="2400"/>
+              <a:defRPr sz="1800"/>
             </a:lvl3pPr>
-            <a:lvl4pPr marL="2743200" indent="0">
+            <a:lvl4pPr marL="2057400" indent="0">
               <a:buNone/>
-              <a:defRPr sz="2000"/>
+              <a:defRPr sz="1500"/>
             </a:lvl4pPr>
-            <a:lvl5pPr marL="3657600" indent="0">
+            <a:lvl5pPr marL="2743200" indent="0">
               <a:buNone/>
-              <a:defRPr sz="2000"/>
+              <a:defRPr sz="1500"/>
             </a:lvl5pPr>
-            <a:lvl6pPr marL="4572000" indent="0">
+            <a:lvl6pPr marL="3429000" indent="0">
               <a:buNone/>
-              <a:defRPr sz="2000"/>
+              <a:defRPr sz="1500"/>
             </a:lvl6pPr>
-            <a:lvl7pPr marL="5486400" indent="0">
+            <a:lvl7pPr marL="4114800" indent="0">
               <a:buNone/>
-              <a:defRPr sz="2000"/>
+              <a:defRPr sz="1500"/>
             </a:lvl7pPr>
-            <a:lvl8pPr marL="6400800" indent="0">
+            <a:lvl8pPr marL="4800600" indent="0">
               <a:buNone/>
-              <a:defRPr sz="2000"/>
+              <a:defRPr sz="1500"/>
             </a:lvl8pPr>
-            <a:lvl9pPr marL="7315200" indent="0">
+            <a:lvl9pPr marL="5486400" indent="0">
               <a:buNone/>
-              <a:defRPr sz="2000"/>
+              <a:defRPr sz="1500"/>
             </a:lvl9pPr>
           </a:lstStyle>
           <a:p>
@@ -2150,7 +2149,7 @@
     </p:spTree>
     <p:extLst>
       <p:ext uri="{BB962C8B-B14F-4D97-AF65-F5344CB8AC3E}">
-        <p14:creationId xmlns:p14="http://schemas.microsoft.com/office/powerpoint/2010/main" val="2708203549"/>
+        <p14:creationId xmlns:p14="http://schemas.microsoft.com/office/powerpoint/2010/main" val="1104848027"/>
       </p:ext>
     </p:extLst>
   </p:cSld>
@@ -2189,15 +2188,15 @@
         </p:nvSpPr>
         <p:spPr>
           <a:xfrm>
-            <a:off x="1679577" y="914400"/>
-            <a:ext cx="7864474" cy="3200400"/>
+            <a:off x="944762" y="1625600"/>
+            <a:ext cx="4423767" cy="5689600"/>
           </a:xfrm>
         </p:spPr>
         <p:txBody>
           <a:bodyPr anchor="b"/>
           <a:lstStyle>
             <a:lvl1pPr>
-              <a:defRPr sz="6400"/>
+              <a:defRPr sz="4800"/>
             </a:lvl1pPr>
           </a:lstStyle>
           <a:p>
@@ -2221,8 +2220,8 @@
         </p:nvSpPr>
         <p:spPr>
           <a:xfrm>
-            <a:off x="10366376" y="1974851"/>
-            <a:ext cx="12344400" cy="9747250"/>
+            <a:off x="5831087" y="3510850"/>
+            <a:ext cx="6943725" cy="17328444"/>
           </a:xfrm>
         </p:spPr>
         <p:txBody>
@@ -2230,39 +2229,39 @@
           <a:lstStyle>
             <a:lvl1pPr marL="0" indent="0">
               <a:buNone/>
-              <a:defRPr sz="6400"/>
+              <a:defRPr sz="4800"/>
             </a:lvl1pPr>
-            <a:lvl2pPr marL="914400" indent="0">
+            <a:lvl2pPr marL="685800" indent="0">
               <a:buNone/>
-              <a:defRPr sz="5600"/>
+              <a:defRPr sz="4200"/>
             </a:lvl2pPr>
-            <a:lvl3pPr marL="1828800" indent="0">
+            <a:lvl3pPr marL="1371600" indent="0">
               <a:buNone/>
-              <a:defRPr sz="4800"/>
+              <a:defRPr sz="3600"/>
             </a:lvl3pPr>
-            <a:lvl4pPr marL="2743200" indent="0">
+            <a:lvl4pPr marL="2057400" indent="0">
               <a:buNone/>
-              <a:defRPr sz="4000"/>
+              <a:defRPr sz="3000"/>
             </a:lvl4pPr>
-            <a:lvl5pPr marL="3657600" indent="0">
+            <a:lvl5pPr marL="2743200" indent="0">
               <a:buNone/>
-              <a:defRPr sz="4000"/>
+              <a:defRPr sz="3000"/>
             </a:lvl5pPr>
-            <a:lvl6pPr marL="4572000" indent="0">
+            <a:lvl6pPr marL="3429000" indent="0">
               <a:buNone/>
-              <a:defRPr sz="4000"/>
+              <a:defRPr sz="3000"/>
             </a:lvl6pPr>
-            <a:lvl7pPr marL="5486400" indent="0">
+            <a:lvl7pPr marL="4114800" indent="0">
               <a:buNone/>
-              <a:defRPr sz="4000"/>
+              <a:defRPr sz="3000"/>
             </a:lvl7pPr>
-            <a:lvl8pPr marL="6400800" indent="0">
+            <a:lvl8pPr marL="4800600" indent="0">
               <a:buNone/>
-              <a:defRPr sz="4000"/>
+              <a:defRPr sz="3000"/>
             </a:lvl8pPr>
-            <a:lvl9pPr marL="7315200" indent="0">
+            <a:lvl9pPr marL="5486400" indent="0">
               <a:buNone/>
-              <a:defRPr sz="4000"/>
+              <a:defRPr sz="3000"/>
             </a:lvl9pPr>
           </a:lstStyle>
           <a:p>
@@ -2286,8 +2285,8 @@
         </p:nvSpPr>
         <p:spPr>
           <a:xfrm>
-            <a:off x="1679577" y="4114800"/>
-            <a:ext cx="7864474" cy="7623176"/>
+            <a:off x="944762" y="7315200"/>
+            <a:ext cx="4423767" cy="13552313"/>
           </a:xfrm>
         </p:spPr>
         <p:txBody>
@@ -2295,39 +2294,39 @@
           <a:lstStyle>
             <a:lvl1pPr marL="0" indent="0">
               <a:buNone/>
-              <a:defRPr sz="3200"/>
+              <a:defRPr sz="2400"/>
             </a:lvl1pPr>
-            <a:lvl2pPr marL="914400" indent="0">
+            <a:lvl2pPr marL="685800" indent="0">
               <a:buNone/>
-              <a:defRPr sz="2800"/>
+              <a:defRPr sz="2100"/>
             </a:lvl2pPr>
-            <a:lvl3pPr marL="1828800" indent="0">
+            <a:lvl3pPr marL="1371600" indent="0">
               <a:buNone/>
-              <a:defRPr sz="2400"/>
+              <a:defRPr sz="1800"/>
             </a:lvl3pPr>
-            <a:lvl4pPr marL="2743200" indent="0">
+            <a:lvl4pPr marL="2057400" indent="0">
               <a:buNone/>
-              <a:defRPr sz="2000"/>
+              <a:defRPr sz="1500"/>
             </a:lvl4pPr>
-            <a:lvl5pPr marL="3657600" indent="0">
+            <a:lvl5pPr marL="2743200" indent="0">
               <a:buNone/>
-              <a:defRPr sz="2000"/>
+              <a:defRPr sz="1500"/>
             </a:lvl5pPr>
-            <a:lvl6pPr marL="4572000" indent="0">
+            <a:lvl6pPr marL="3429000" indent="0">
               <a:buNone/>
-              <a:defRPr sz="2000"/>
+              <a:defRPr sz="1500"/>
             </a:lvl6pPr>
-            <a:lvl7pPr marL="5486400" indent="0">
+            <a:lvl7pPr marL="4114800" indent="0">
               <a:buNone/>
-              <a:defRPr sz="2000"/>
+              <a:defRPr sz="1500"/>
             </a:lvl7pPr>
-            <a:lvl8pPr marL="6400800" indent="0">
+            <a:lvl8pPr marL="4800600" indent="0">
               <a:buNone/>
-              <a:defRPr sz="2000"/>
+              <a:defRPr sz="1500"/>
             </a:lvl8pPr>
-            <a:lvl9pPr marL="7315200" indent="0">
+            <a:lvl9pPr marL="5486400" indent="0">
               <a:buNone/>
-              <a:defRPr sz="2000"/>
+              <a:defRPr sz="1500"/>
             </a:lvl9pPr>
           </a:lstStyle>
           <a:p>
@@ -2407,7 +2406,7 @@
     </p:spTree>
     <p:extLst>
       <p:ext uri="{BB962C8B-B14F-4D97-AF65-F5344CB8AC3E}">
-        <p14:creationId xmlns:p14="http://schemas.microsoft.com/office/powerpoint/2010/main" val="1546910093"/>
+        <p14:creationId xmlns:p14="http://schemas.microsoft.com/office/powerpoint/2010/main" val="2994074094"/>
       </p:ext>
     </p:extLst>
   </p:cSld>
@@ -2451,8 +2450,8 @@
         </p:nvSpPr>
         <p:spPr>
           <a:xfrm>
-            <a:off x="1676400" y="730251"/>
-            <a:ext cx="21031200" cy="2651126"/>
+            <a:off x="942975" y="1298228"/>
+            <a:ext cx="11830050" cy="4713113"/>
           </a:xfrm>
           <a:prstGeom prst="rect">
             <a:avLst/>
@@ -2484,8 +2483,8 @@
         </p:nvSpPr>
         <p:spPr>
           <a:xfrm>
-            <a:off x="1676400" y="3651250"/>
-            <a:ext cx="21031200" cy="8702676"/>
+            <a:off x="942975" y="6491111"/>
+            <a:ext cx="11830050" cy="15471424"/>
           </a:xfrm>
           <a:prstGeom prst="rect">
             <a:avLst/>
@@ -2546,8 +2545,8 @@
         </p:nvSpPr>
         <p:spPr>
           <a:xfrm>
-            <a:off x="1676400" y="12712701"/>
-            <a:ext cx="5486400" cy="730250"/>
+            <a:off x="942975" y="22600361"/>
+            <a:ext cx="3086100" cy="1298222"/>
           </a:xfrm>
           <a:prstGeom prst="rect">
             <a:avLst/>
@@ -2557,7 +2556,7 @@
           <a:bodyPr vert="horz" lIns="91440" tIns="45720" rIns="91440" bIns="45720" rtlCol="0" anchor="ctr"/>
           <a:lstStyle>
             <a:lvl1pPr algn="l">
-              <a:defRPr sz="2400">
+              <a:defRPr sz="1800">
                 <a:solidFill>
                   <a:schemeClr val="tx1">
                     <a:tint val="75000"/>
@@ -2587,8 +2586,8 @@
         </p:nvSpPr>
         <p:spPr>
           <a:xfrm>
-            <a:off x="8077200" y="12712701"/>
-            <a:ext cx="8229600" cy="730250"/>
+            <a:off x="4543425" y="22600361"/>
+            <a:ext cx="4629150" cy="1298222"/>
           </a:xfrm>
           <a:prstGeom prst="rect">
             <a:avLst/>
@@ -2598,7 +2597,7 @@
           <a:bodyPr vert="horz" lIns="91440" tIns="45720" rIns="91440" bIns="45720" rtlCol="0" anchor="ctr"/>
           <a:lstStyle>
             <a:lvl1pPr algn="ctr">
-              <a:defRPr sz="2400">
+              <a:defRPr sz="1800">
                 <a:solidFill>
                   <a:schemeClr val="tx1">
                     <a:tint val="75000"/>
@@ -2624,8 +2623,8 @@
         </p:nvSpPr>
         <p:spPr>
           <a:xfrm>
-            <a:off x="17221200" y="12712701"/>
-            <a:ext cx="5486400" cy="730250"/>
+            <a:off x="9686925" y="22600361"/>
+            <a:ext cx="3086100" cy="1298222"/>
           </a:xfrm>
           <a:prstGeom prst="rect">
             <a:avLst/>
@@ -2635,7 +2634,7 @@
           <a:bodyPr vert="horz" lIns="91440" tIns="45720" rIns="91440" bIns="45720" rtlCol="0" anchor="ctr"/>
           <a:lstStyle>
             <a:lvl1pPr algn="r">
-              <a:defRPr sz="2400">
+              <a:defRPr sz="1800">
                 <a:solidFill>
                   <a:schemeClr val="tx1">
                     <a:tint val="75000"/>
@@ -2656,27 +2655,27 @@
     </p:spTree>
     <p:extLst>
       <p:ext uri="{BB962C8B-B14F-4D97-AF65-F5344CB8AC3E}">
-        <p14:creationId xmlns:p14="http://schemas.microsoft.com/office/powerpoint/2010/main" val="2736273576"/>
+        <p14:creationId xmlns:p14="http://schemas.microsoft.com/office/powerpoint/2010/main" val="1599359596"/>
       </p:ext>
     </p:extLst>
   </p:cSld>
   <p:clrMap bg1="lt1" tx1="dk1" bg2="lt2" tx2="dk2" accent1="accent1" accent2="accent2" accent3="accent3" accent4="accent4" accent5="accent5" accent6="accent6" hlink="hlink" folHlink="folHlink"/>
   <p:sldLayoutIdLst>
-    <p:sldLayoutId id="2147483661" r:id="rId1"/>
-    <p:sldLayoutId id="2147483662" r:id="rId2"/>
-    <p:sldLayoutId id="2147483663" r:id="rId3"/>
-    <p:sldLayoutId id="2147483664" r:id="rId4"/>
-    <p:sldLayoutId id="2147483665" r:id="rId5"/>
-    <p:sldLayoutId id="2147483666" r:id="rId6"/>
-    <p:sldLayoutId id="2147483667" r:id="rId7"/>
-    <p:sldLayoutId id="2147483668" r:id="rId8"/>
-    <p:sldLayoutId id="2147483669" r:id="rId9"/>
-    <p:sldLayoutId id="2147483670" r:id="rId10"/>
-    <p:sldLayoutId id="2147483671" r:id="rId11"/>
+    <p:sldLayoutId id="2147483673" r:id="rId1"/>
+    <p:sldLayoutId id="2147483674" r:id="rId2"/>
+    <p:sldLayoutId id="2147483675" r:id="rId3"/>
+    <p:sldLayoutId id="2147483676" r:id="rId4"/>
+    <p:sldLayoutId id="2147483677" r:id="rId5"/>
+    <p:sldLayoutId id="2147483678" r:id="rId6"/>
+    <p:sldLayoutId id="2147483679" r:id="rId7"/>
+    <p:sldLayoutId id="2147483680" r:id="rId8"/>
+    <p:sldLayoutId id="2147483681" r:id="rId9"/>
+    <p:sldLayoutId id="2147483682" r:id="rId10"/>
+    <p:sldLayoutId id="2147483683" r:id="rId11"/>
   </p:sldLayoutIdLst>
   <p:txStyles>
     <p:titleStyle>
-      <a:lvl1pPr algn="l" defTabSz="1828800" rtl="0" eaLnBrk="1" latinLnBrk="0" hangingPunct="1">
+      <a:lvl1pPr algn="l" defTabSz="1371600" rtl="0" eaLnBrk="1" latinLnBrk="0" hangingPunct="1">
         <a:lnSpc>
           <a:spcPct val="90000"/>
         </a:lnSpc>
@@ -2684,7 +2683,7 @@
           <a:spcPct val="0"/>
         </a:spcBef>
         <a:buNone/>
-        <a:defRPr sz="8800" kern="1200">
+        <a:defRPr sz="6600" kern="1200">
           <a:solidFill>
             <a:schemeClr val="tx1"/>
           </a:solidFill>
@@ -2695,16 +2694,16 @@
       </a:lvl1pPr>
     </p:titleStyle>
     <p:bodyStyle>
-      <a:lvl1pPr marL="457200" indent="-457200" algn="l" defTabSz="1828800" rtl="0" eaLnBrk="1" latinLnBrk="0" hangingPunct="1">
+      <a:lvl1pPr marL="342900" indent="-342900" algn="l" defTabSz="1371600" rtl="0" eaLnBrk="1" latinLnBrk="0" hangingPunct="1">
         <a:lnSpc>
           <a:spcPct val="90000"/>
         </a:lnSpc>
         <a:spcBef>
-          <a:spcPts val="2000"/>
+          <a:spcPts val="1500"/>
         </a:spcBef>
         <a:buFont typeface="Arial" panose="020B0604020202020204" pitchFamily="34" charset="0"/>
         <a:buChar char="•"/>
-        <a:defRPr sz="5600" kern="1200">
+        <a:defRPr sz="4200" kern="1200">
           <a:solidFill>
             <a:schemeClr val="tx1"/>
           </a:solidFill>
@@ -2713,48 +2712,12 @@
           <a:cs typeface="+mn-cs"/>
         </a:defRPr>
       </a:lvl1pPr>
-      <a:lvl2pPr marL="1371600" indent="-457200" algn="l" defTabSz="1828800" rtl="0" eaLnBrk="1" latinLnBrk="0" hangingPunct="1">
+      <a:lvl2pPr marL="1028700" indent="-342900" algn="l" defTabSz="1371600" rtl="0" eaLnBrk="1" latinLnBrk="0" hangingPunct="1">
         <a:lnSpc>
           <a:spcPct val="90000"/>
         </a:lnSpc>
         <a:spcBef>
-          <a:spcPts val="1000"/>
-        </a:spcBef>
-        <a:buFont typeface="Arial" panose="020B0604020202020204" pitchFamily="34" charset="0"/>
-        <a:buChar char="•"/>
-        <a:defRPr sz="4800" kern="1200">
-          <a:solidFill>
-            <a:schemeClr val="tx1"/>
-          </a:solidFill>
-          <a:latin typeface="+mn-lt"/>
-          <a:ea typeface="+mn-ea"/>
-          <a:cs typeface="+mn-cs"/>
-        </a:defRPr>
-      </a:lvl2pPr>
-      <a:lvl3pPr marL="2286000" indent="-457200" algn="l" defTabSz="1828800" rtl="0" eaLnBrk="1" latinLnBrk="0" hangingPunct="1">
-        <a:lnSpc>
-          <a:spcPct val="90000"/>
-        </a:lnSpc>
-        <a:spcBef>
-          <a:spcPts val="1000"/>
-        </a:spcBef>
-        <a:buFont typeface="Arial" panose="020B0604020202020204" pitchFamily="34" charset="0"/>
-        <a:buChar char="•"/>
-        <a:defRPr sz="4000" kern="1200">
-          <a:solidFill>
-            <a:schemeClr val="tx1"/>
-          </a:solidFill>
-          <a:latin typeface="+mn-lt"/>
-          <a:ea typeface="+mn-ea"/>
-          <a:cs typeface="+mn-cs"/>
-        </a:defRPr>
-      </a:lvl3pPr>
-      <a:lvl4pPr marL="3200400" indent="-457200" algn="l" defTabSz="1828800" rtl="0" eaLnBrk="1" latinLnBrk="0" hangingPunct="1">
-        <a:lnSpc>
-          <a:spcPct val="90000"/>
-        </a:lnSpc>
-        <a:spcBef>
-          <a:spcPts val="1000"/>
+          <a:spcPts val="750"/>
         </a:spcBef>
         <a:buFont typeface="Arial" panose="020B0604020202020204" pitchFamily="34" charset="0"/>
         <a:buChar char="•"/>
@@ -2766,17 +2729,53 @@
           <a:ea typeface="+mn-ea"/>
           <a:cs typeface="+mn-cs"/>
         </a:defRPr>
-      </a:lvl4pPr>
-      <a:lvl5pPr marL="4114800" indent="-457200" algn="l" defTabSz="1828800" rtl="0" eaLnBrk="1" latinLnBrk="0" hangingPunct="1">
+      </a:lvl2pPr>
+      <a:lvl3pPr marL="1714500" indent="-342900" algn="l" defTabSz="1371600" rtl="0" eaLnBrk="1" latinLnBrk="0" hangingPunct="1">
         <a:lnSpc>
           <a:spcPct val="90000"/>
         </a:lnSpc>
         <a:spcBef>
-          <a:spcPts val="1000"/>
+          <a:spcPts val="750"/>
         </a:spcBef>
         <a:buFont typeface="Arial" panose="020B0604020202020204" pitchFamily="34" charset="0"/>
         <a:buChar char="•"/>
-        <a:defRPr sz="3600" kern="1200">
+        <a:defRPr sz="3000" kern="1200">
+          <a:solidFill>
+            <a:schemeClr val="tx1"/>
+          </a:solidFill>
+          <a:latin typeface="+mn-lt"/>
+          <a:ea typeface="+mn-ea"/>
+          <a:cs typeface="+mn-cs"/>
+        </a:defRPr>
+      </a:lvl3pPr>
+      <a:lvl4pPr marL="2400300" indent="-342900" algn="l" defTabSz="1371600" rtl="0" eaLnBrk="1" latinLnBrk="0" hangingPunct="1">
+        <a:lnSpc>
+          <a:spcPct val="90000"/>
+        </a:lnSpc>
+        <a:spcBef>
+          <a:spcPts val="750"/>
+        </a:spcBef>
+        <a:buFont typeface="Arial" panose="020B0604020202020204" pitchFamily="34" charset="0"/>
+        <a:buChar char="•"/>
+        <a:defRPr sz="2700" kern="1200">
+          <a:solidFill>
+            <a:schemeClr val="tx1"/>
+          </a:solidFill>
+          <a:latin typeface="+mn-lt"/>
+          <a:ea typeface="+mn-ea"/>
+          <a:cs typeface="+mn-cs"/>
+        </a:defRPr>
+      </a:lvl4pPr>
+      <a:lvl5pPr marL="3086100" indent="-342900" algn="l" defTabSz="1371600" rtl="0" eaLnBrk="1" latinLnBrk="0" hangingPunct="1">
+        <a:lnSpc>
+          <a:spcPct val="90000"/>
+        </a:lnSpc>
+        <a:spcBef>
+          <a:spcPts val="750"/>
+        </a:spcBef>
+        <a:buFont typeface="Arial" panose="020B0604020202020204" pitchFamily="34" charset="0"/>
+        <a:buChar char="•"/>
+        <a:defRPr sz="2700" kern="1200">
           <a:solidFill>
             <a:schemeClr val="tx1"/>
           </a:solidFill>
@@ -2785,16 +2784,16 @@
           <a:cs typeface="+mn-cs"/>
         </a:defRPr>
       </a:lvl5pPr>
-      <a:lvl6pPr marL="5029200" indent="-457200" algn="l" defTabSz="1828800" rtl="0" eaLnBrk="1" latinLnBrk="0" hangingPunct="1">
+      <a:lvl6pPr marL="3771900" indent="-342900" algn="l" defTabSz="1371600" rtl="0" eaLnBrk="1" latinLnBrk="0" hangingPunct="1">
         <a:lnSpc>
           <a:spcPct val="90000"/>
         </a:lnSpc>
         <a:spcBef>
-          <a:spcPts val="1000"/>
+          <a:spcPts val="750"/>
         </a:spcBef>
         <a:buFont typeface="Arial" panose="020B0604020202020204" pitchFamily="34" charset="0"/>
         <a:buChar char="•"/>
-        <a:defRPr sz="3600" kern="1200">
+        <a:defRPr sz="2700" kern="1200">
           <a:solidFill>
             <a:schemeClr val="tx1"/>
           </a:solidFill>
@@ -2803,16 +2802,16 @@
           <a:cs typeface="+mn-cs"/>
         </a:defRPr>
       </a:lvl6pPr>
-      <a:lvl7pPr marL="5943600" indent="-457200" algn="l" defTabSz="1828800" rtl="0" eaLnBrk="1" latinLnBrk="0" hangingPunct="1">
+      <a:lvl7pPr marL="4457700" indent="-342900" algn="l" defTabSz="1371600" rtl="0" eaLnBrk="1" latinLnBrk="0" hangingPunct="1">
         <a:lnSpc>
           <a:spcPct val="90000"/>
         </a:lnSpc>
         <a:spcBef>
-          <a:spcPts val="1000"/>
+          <a:spcPts val="750"/>
         </a:spcBef>
         <a:buFont typeface="Arial" panose="020B0604020202020204" pitchFamily="34" charset="0"/>
         <a:buChar char="•"/>
-        <a:defRPr sz="3600" kern="1200">
+        <a:defRPr sz="2700" kern="1200">
           <a:solidFill>
             <a:schemeClr val="tx1"/>
           </a:solidFill>
@@ -2821,16 +2820,16 @@
           <a:cs typeface="+mn-cs"/>
         </a:defRPr>
       </a:lvl7pPr>
-      <a:lvl8pPr marL="6858000" indent="-457200" algn="l" defTabSz="1828800" rtl="0" eaLnBrk="1" latinLnBrk="0" hangingPunct="1">
+      <a:lvl8pPr marL="5143500" indent="-342900" algn="l" defTabSz="1371600" rtl="0" eaLnBrk="1" latinLnBrk="0" hangingPunct="1">
         <a:lnSpc>
           <a:spcPct val="90000"/>
         </a:lnSpc>
         <a:spcBef>
-          <a:spcPts val="1000"/>
+          <a:spcPts val="750"/>
         </a:spcBef>
         <a:buFont typeface="Arial" panose="020B0604020202020204" pitchFamily="34" charset="0"/>
         <a:buChar char="•"/>
-        <a:defRPr sz="3600" kern="1200">
+        <a:defRPr sz="2700" kern="1200">
           <a:solidFill>
             <a:schemeClr val="tx1"/>
           </a:solidFill>
@@ -2839,16 +2838,16 @@
           <a:cs typeface="+mn-cs"/>
         </a:defRPr>
       </a:lvl8pPr>
-      <a:lvl9pPr marL="7772400" indent="-457200" algn="l" defTabSz="1828800" rtl="0" eaLnBrk="1" latinLnBrk="0" hangingPunct="1">
+      <a:lvl9pPr marL="5829300" indent="-342900" algn="l" defTabSz="1371600" rtl="0" eaLnBrk="1" latinLnBrk="0" hangingPunct="1">
         <a:lnSpc>
           <a:spcPct val="90000"/>
         </a:lnSpc>
         <a:spcBef>
-          <a:spcPts val="1000"/>
+          <a:spcPts val="750"/>
         </a:spcBef>
         <a:buFont typeface="Arial" panose="020B0604020202020204" pitchFamily="34" charset="0"/>
         <a:buChar char="•"/>
-        <a:defRPr sz="3600" kern="1200">
+        <a:defRPr sz="2700" kern="1200">
           <a:solidFill>
             <a:schemeClr val="tx1"/>
           </a:solidFill>
@@ -2862,8 +2861,8 @@
       <a:defPPr>
         <a:defRPr lang="en-US"/>
       </a:defPPr>
-      <a:lvl1pPr marL="0" algn="l" defTabSz="1828800" rtl="0" eaLnBrk="1" latinLnBrk="0" hangingPunct="1">
-        <a:defRPr sz="3600" kern="1200">
+      <a:lvl1pPr marL="0" algn="l" defTabSz="1371600" rtl="0" eaLnBrk="1" latinLnBrk="0" hangingPunct="1">
+        <a:defRPr sz="2700" kern="1200">
           <a:solidFill>
             <a:schemeClr val="tx1"/>
           </a:solidFill>
@@ -2872,8 +2871,8 @@
           <a:cs typeface="+mn-cs"/>
         </a:defRPr>
       </a:lvl1pPr>
-      <a:lvl2pPr marL="914400" algn="l" defTabSz="1828800" rtl="0" eaLnBrk="1" latinLnBrk="0" hangingPunct="1">
-        <a:defRPr sz="3600" kern="1200">
+      <a:lvl2pPr marL="685800" algn="l" defTabSz="1371600" rtl="0" eaLnBrk="1" latinLnBrk="0" hangingPunct="1">
+        <a:defRPr sz="2700" kern="1200">
           <a:solidFill>
             <a:schemeClr val="tx1"/>
           </a:solidFill>
@@ -2882,8 +2881,8 @@
           <a:cs typeface="+mn-cs"/>
         </a:defRPr>
       </a:lvl2pPr>
-      <a:lvl3pPr marL="1828800" algn="l" defTabSz="1828800" rtl="0" eaLnBrk="1" latinLnBrk="0" hangingPunct="1">
-        <a:defRPr sz="3600" kern="1200">
+      <a:lvl3pPr marL="1371600" algn="l" defTabSz="1371600" rtl="0" eaLnBrk="1" latinLnBrk="0" hangingPunct="1">
+        <a:defRPr sz="2700" kern="1200">
           <a:solidFill>
             <a:schemeClr val="tx1"/>
           </a:solidFill>
@@ -2892,8 +2891,8 @@
           <a:cs typeface="+mn-cs"/>
         </a:defRPr>
       </a:lvl3pPr>
-      <a:lvl4pPr marL="2743200" algn="l" defTabSz="1828800" rtl="0" eaLnBrk="1" latinLnBrk="0" hangingPunct="1">
-        <a:defRPr sz="3600" kern="1200">
+      <a:lvl4pPr marL="2057400" algn="l" defTabSz="1371600" rtl="0" eaLnBrk="1" latinLnBrk="0" hangingPunct="1">
+        <a:defRPr sz="2700" kern="1200">
           <a:solidFill>
             <a:schemeClr val="tx1"/>
           </a:solidFill>
@@ -2902,8 +2901,8 @@
           <a:cs typeface="+mn-cs"/>
         </a:defRPr>
       </a:lvl4pPr>
-      <a:lvl5pPr marL="3657600" algn="l" defTabSz="1828800" rtl="0" eaLnBrk="1" latinLnBrk="0" hangingPunct="1">
-        <a:defRPr sz="3600" kern="1200">
+      <a:lvl5pPr marL="2743200" algn="l" defTabSz="1371600" rtl="0" eaLnBrk="1" latinLnBrk="0" hangingPunct="1">
+        <a:defRPr sz="2700" kern="1200">
           <a:solidFill>
             <a:schemeClr val="tx1"/>
           </a:solidFill>
@@ -2912,8 +2911,8 @@
           <a:cs typeface="+mn-cs"/>
         </a:defRPr>
       </a:lvl5pPr>
-      <a:lvl6pPr marL="4572000" algn="l" defTabSz="1828800" rtl="0" eaLnBrk="1" latinLnBrk="0" hangingPunct="1">
-        <a:defRPr sz="3600" kern="1200">
+      <a:lvl6pPr marL="3429000" algn="l" defTabSz="1371600" rtl="0" eaLnBrk="1" latinLnBrk="0" hangingPunct="1">
+        <a:defRPr sz="2700" kern="1200">
           <a:solidFill>
             <a:schemeClr val="tx1"/>
           </a:solidFill>
@@ -2922,8 +2921,8 @@
           <a:cs typeface="+mn-cs"/>
         </a:defRPr>
       </a:lvl6pPr>
-      <a:lvl7pPr marL="5486400" algn="l" defTabSz="1828800" rtl="0" eaLnBrk="1" latinLnBrk="0" hangingPunct="1">
-        <a:defRPr sz="3600" kern="1200">
+      <a:lvl7pPr marL="4114800" algn="l" defTabSz="1371600" rtl="0" eaLnBrk="1" latinLnBrk="0" hangingPunct="1">
+        <a:defRPr sz="2700" kern="1200">
           <a:solidFill>
             <a:schemeClr val="tx1"/>
           </a:solidFill>
@@ -2932,8 +2931,8 @@
           <a:cs typeface="+mn-cs"/>
         </a:defRPr>
       </a:lvl7pPr>
-      <a:lvl8pPr marL="6400800" algn="l" defTabSz="1828800" rtl="0" eaLnBrk="1" latinLnBrk="0" hangingPunct="1">
-        <a:defRPr sz="3600" kern="1200">
+      <a:lvl8pPr marL="4800600" algn="l" defTabSz="1371600" rtl="0" eaLnBrk="1" latinLnBrk="0" hangingPunct="1">
+        <a:defRPr sz="2700" kern="1200">
           <a:solidFill>
             <a:schemeClr val="tx1"/>
           </a:solidFill>
@@ -2942,8 +2941,8 @@
           <a:cs typeface="+mn-cs"/>
         </a:defRPr>
       </a:lvl8pPr>
-      <a:lvl9pPr marL="7315200" algn="l" defTabSz="1828800" rtl="0" eaLnBrk="1" latinLnBrk="0" hangingPunct="1">
-        <a:defRPr sz="3600" kern="1200">
+      <a:lvl9pPr marL="5486400" algn="l" defTabSz="1371600" rtl="0" eaLnBrk="1" latinLnBrk="0" hangingPunct="1">
+        <a:defRPr sz="2700" kern="1200">
           <a:solidFill>
             <a:schemeClr val="tx1"/>
           </a:solidFill>
@@ -2992,8 +2991,8 @@
         </p:nvCxnSpPr>
         <p:spPr>
           <a:xfrm>
-            <a:off x="17463720" y="1567412"/>
-            <a:ext cx="2143330" cy="2756966"/>
+            <a:off x="9823343" y="9216044"/>
+            <a:ext cx="1205623" cy="1550793"/>
           </a:xfrm>
           <a:prstGeom prst="straightConnector1">
             <a:avLst/>
@@ -3038,8 +3037,8 @@
         </p:nvCxnSpPr>
         <p:spPr>
           <a:xfrm flipH="1">
-            <a:off x="4584279" y="6836490"/>
-            <a:ext cx="4059473" cy="3678052"/>
+            <a:off x="2578657" y="12179901"/>
+            <a:ext cx="2283454" cy="2068904"/>
           </a:xfrm>
           <a:prstGeom prst="straightConnector1">
             <a:avLst/>
@@ -3084,8 +3083,8 @@
         </p:nvCxnSpPr>
         <p:spPr>
           <a:xfrm flipH="1">
-            <a:off x="4584279" y="1773984"/>
-            <a:ext cx="4681966" cy="8740558"/>
+            <a:off x="2578657" y="9332241"/>
+            <a:ext cx="2633606" cy="4916564"/>
           </a:xfrm>
           <a:prstGeom prst="straightConnector1">
             <a:avLst/>
@@ -3126,8 +3125,8 @@
         </p:nvSpPr>
         <p:spPr>
           <a:xfrm>
-            <a:off x="7088697" y="575102"/>
-            <a:ext cx="4355096" cy="1198882"/>
+            <a:off x="3987392" y="8657870"/>
+            <a:ext cx="2449742" cy="674371"/>
           </a:xfrm>
           <a:prstGeom prst="roundRect">
             <a:avLst/>
@@ -3155,7 +3154,7 @@
           <a:p>
             <a:pPr algn="ctr"/>
             <a:r>
-              <a:rPr lang="en-US" sz="1600" dirty="0"/>
+              <a:rPr lang="en-US" sz="900" dirty="0"/>
               <a:t>Lemma 1: Bayes Risks of L and L|_R2 are equal</a:t>
             </a:r>
           </a:p>
@@ -3175,8 +3174,8 @@
         </p:nvSpPr>
         <p:spPr>
           <a:xfrm>
-            <a:off x="10037196" y="3030397"/>
-            <a:ext cx="4355096" cy="1110038"/>
+            <a:off x="5645923" y="10038974"/>
+            <a:ext cx="2449742" cy="624396"/>
           </a:xfrm>
           <a:prstGeom prst="roundRect">
             <a:avLst/>
@@ -3204,27 +3203,27 @@
           <a:p>
             <a:pPr algn="ctr"/>
             <a:r>
-              <a:rPr lang="en-US" sz="1600" dirty="0"/>
+              <a:rPr lang="en-US" sz="900" dirty="0"/>
               <a:t>Prop 1: L embeds ell </a:t>
             </a:r>
             <a:r>
-              <a:rPr lang="en-US" sz="1600" dirty="0" err="1"/>
+              <a:rPr lang="en-US" sz="900" dirty="0" err="1"/>
               <a:t>iff</a:t>
             </a:r>
             <a:r>
-              <a:rPr lang="en-US" sz="1600" dirty="0"/>
+              <a:rPr lang="en-US" sz="900" dirty="0"/>
               <a:t> </a:t>
             </a:r>
             <a:r>
-              <a:rPr lang="en-US" sz="1600" u="sng" dirty="0"/>
+              <a:rPr lang="en-US" sz="900" u="sng" dirty="0"/>
               <a:t>L</a:t>
             </a:r>
             <a:r>
-              <a:rPr lang="en-US" sz="1600" dirty="0"/>
+              <a:rPr lang="en-US" sz="900" dirty="0"/>
               <a:t> = </a:t>
             </a:r>
             <a:r>
-              <a:rPr lang="en-US" sz="1600" u="sng" dirty="0"/>
+              <a:rPr lang="en-US" sz="900" u="sng" dirty="0"/>
               <a:t>ell</a:t>
             </a:r>
           </a:p>
@@ -3244,8 +3243,8 @@
         </p:nvSpPr>
         <p:spPr>
           <a:xfrm>
-            <a:off x="11350221" y="5510257"/>
-            <a:ext cx="4865459" cy="1056638"/>
+            <a:off x="6384499" y="11433895"/>
+            <a:ext cx="2736821" cy="594359"/>
           </a:xfrm>
           <a:prstGeom prst="roundRect">
             <a:avLst/>
@@ -3273,23 +3272,23 @@
           <a:p>
             <a:pPr algn="ctr"/>
             <a:r>
-              <a:rPr lang="en-US" sz="1600" dirty="0"/>
+              <a:rPr lang="en-US" sz="900" dirty="0"/>
               <a:t>Prop 2: L embeds discrete loss </a:t>
             </a:r>
             <a:r>
-              <a:rPr lang="en-US" sz="1600" dirty="0" err="1"/>
+              <a:rPr lang="en-US" sz="900" dirty="0" err="1"/>
               <a:t>iff</a:t>
             </a:r>
             <a:r>
-              <a:rPr lang="en-US" sz="1600" dirty="0"/>
+              <a:rPr lang="en-US" sz="900" dirty="0"/>
               <a:t> </a:t>
             </a:r>
             <a:r>
-              <a:rPr lang="en-US" sz="1600" u="sng" dirty="0"/>
+              <a:rPr lang="en-US" sz="900" u="sng" dirty="0"/>
               <a:t>L</a:t>
             </a:r>
             <a:r>
-              <a:rPr lang="en-US" sz="1600" dirty="0"/>
+              <a:rPr lang="en-US" sz="900" dirty="0"/>
               <a:t> polyhedral</a:t>
             </a:r>
           </a:p>
@@ -3309,8 +3308,8 @@
         </p:nvSpPr>
         <p:spPr>
           <a:xfrm>
-            <a:off x="14703577" y="8964348"/>
-            <a:ext cx="4567747" cy="927627"/>
+            <a:off x="8270762" y="13376821"/>
+            <a:ext cx="2569358" cy="521790"/>
           </a:xfrm>
           <a:prstGeom prst="roundRect">
             <a:avLst/>
@@ -3338,7 +3337,7 @@
           <a:p>
             <a:pPr algn="ctr"/>
             <a:r>
-              <a:rPr lang="en-US" sz="1600" dirty="0"/>
+              <a:rPr lang="en-US" sz="900" dirty="0"/>
               <a:t>Theorem 2: Every polyhedral L embeds a discrete loss</a:t>
             </a:r>
           </a:p>
@@ -3358,8 +3357,8 @@
         </p:nvSpPr>
         <p:spPr>
           <a:xfrm>
-            <a:off x="2068985" y="5636040"/>
-            <a:ext cx="4005167" cy="1145482"/>
+            <a:off x="1163805" y="11504647"/>
+            <a:ext cx="2252906" cy="644334"/>
           </a:xfrm>
           <a:prstGeom prst="roundRect">
             <a:avLst/>
@@ -3387,7 +3386,7 @@
           <a:p>
             <a:pPr algn="ctr"/>
             <a:r>
-              <a:rPr lang="en-US" sz="1600" dirty="0"/>
+              <a:rPr lang="en-US" sz="900" dirty="0"/>
               <a:t>Theorem 3: Every discrete ell embedded by polyhedral loss</a:t>
             </a:r>
           </a:p>
@@ -3411,8 +3410,8 @@
         </p:nvCxnSpPr>
         <p:spPr>
           <a:xfrm>
-            <a:off x="9266245" y="1773984"/>
-            <a:ext cx="2948499" cy="1256413"/>
+            <a:off x="5212263" y="9332241"/>
+            <a:ext cx="1658531" cy="706732"/>
           </a:xfrm>
           <a:prstGeom prst="straightConnector1">
             <a:avLst/>
@@ -3453,8 +3452,8 @@
         </p:nvSpPr>
         <p:spPr>
           <a:xfrm>
-            <a:off x="15286172" y="368530"/>
-            <a:ext cx="4355096" cy="1198882"/>
+            <a:off x="8598472" y="8541673"/>
+            <a:ext cx="2449742" cy="674371"/>
           </a:xfrm>
           <a:prstGeom prst="roundRect">
             <a:avLst/>
@@ -3488,7 +3487,7 @@
           <a:p>
             <a:pPr algn="ctr"/>
             <a:r>
-              <a:rPr lang="en-US" sz="1600" dirty="0"/>
+              <a:rPr lang="en-US" sz="900" dirty="0"/>
               <a:t>Theorem 1: A cell complex is affinely equivalent to a convex polyhedron if and only if it is a power diagram. </a:t>
             </a:r>
           </a:p>
@@ -3512,8 +3511,8 @@
         </p:nvCxnSpPr>
         <p:spPr>
           <a:xfrm flipH="1">
-            <a:off x="12214744" y="1567412"/>
-            <a:ext cx="5248976" cy="1462985"/>
+            <a:off x="6870794" y="9216045"/>
+            <a:ext cx="2952549" cy="822929"/>
           </a:xfrm>
           <a:prstGeom prst="straightConnector1">
             <a:avLst/>
@@ -3558,8 +3557,8 @@
         </p:nvCxnSpPr>
         <p:spPr>
           <a:xfrm>
-            <a:off x="12214744" y="4140435"/>
-            <a:ext cx="1568207" cy="1369822"/>
+            <a:off x="6870794" y="10663370"/>
+            <a:ext cx="882116" cy="770525"/>
           </a:xfrm>
           <a:prstGeom prst="straightConnector1">
             <a:avLst/>
@@ -3604,8 +3603,8 @@
         </p:nvCxnSpPr>
         <p:spPr>
           <a:xfrm flipH="1">
-            <a:off x="13782951" y="1567412"/>
-            <a:ext cx="3680769" cy="3942845"/>
+            <a:off x="7752910" y="9216045"/>
+            <a:ext cx="2070433" cy="2217850"/>
           </a:xfrm>
           <a:prstGeom prst="straightConnector1">
             <a:avLst/>
@@ -3649,8 +3648,8 @@
         </p:nvCxnSpPr>
         <p:spPr>
           <a:xfrm>
-            <a:off x="13782951" y="6566895"/>
-            <a:ext cx="3204500" cy="2377996"/>
+            <a:off x="7752910" y="12028253"/>
+            <a:ext cx="1802531" cy="1337623"/>
           </a:xfrm>
           <a:prstGeom prst="straightConnector1">
             <a:avLst/>
@@ -3691,8 +3690,8 @@
         </p:nvSpPr>
         <p:spPr>
           <a:xfrm>
-            <a:off x="17429502" y="7377719"/>
-            <a:ext cx="4355096" cy="1145482"/>
+            <a:off x="9804095" y="12484342"/>
+            <a:ext cx="2449742" cy="644334"/>
           </a:xfrm>
           <a:prstGeom prst="roundRect">
             <a:avLst/>
@@ -3726,18 +3725,18 @@
           <a:p>
             <a:pPr algn="ctr"/>
             <a:r>
-              <a:rPr lang="en-US" sz="1600" dirty="0"/>
+              <a:rPr lang="en-US" sz="900" dirty="0"/>
               <a:t>Lemma 4: L polyhedral implies </a:t>
             </a:r>
             <a:r>
-              <a:rPr lang="en-US" sz="1600" u="sng" dirty="0"/>
+              <a:rPr lang="en-US" sz="900" u="sng" dirty="0"/>
               <a:t>L</a:t>
             </a:r>
             <a:r>
-              <a:rPr lang="en-US" sz="1600" dirty="0"/>
+              <a:rPr lang="en-US" sz="900" dirty="0"/>
               <a:t> polyhedral</a:t>
             </a:r>
-            <a:endParaRPr lang="en-US" sz="1600" u="sng" dirty="0"/>
+            <a:endParaRPr lang="en-US" sz="900" u="sng" dirty="0"/>
           </a:p>
         </p:txBody>
       </p:sp>
@@ -3758,8 +3757,8 @@
         </p:nvCxnSpPr>
         <p:spPr>
           <a:xfrm flipH="1">
-            <a:off x="16987451" y="8523201"/>
-            <a:ext cx="2619599" cy="421690"/>
+            <a:off x="9555442" y="13128675"/>
+            <a:ext cx="1473524" cy="237201"/>
           </a:xfrm>
           <a:prstGeom prst="straightConnector1">
             <a:avLst/>
@@ -3800,8 +3799,8 @@
         </p:nvSpPr>
         <p:spPr>
           <a:xfrm>
-            <a:off x="17429502" y="5775040"/>
-            <a:ext cx="4355096" cy="1145482"/>
+            <a:off x="9804095" y="11582835"/>
+            <a:ext cx="2449742" cy="644334"/>
           </a:xfrm>
           <a:prstGeom prst="roundRect">
             <a:avLst/>
@@ -3835,14 +3834,14 @@
           <a:p>
             <a:pPr algn="ctr"/>
             <a:r>
-              <a:rPr lang="en-US" sz="1600" dirty="0"/>
+              <a:rPr lang="en-US" sz="900" dirty="0"/>
               <a:t>Lemma 3: Range of (property elicited by polyhedral loss) is finite set of closed </a:t>
             </a:r>
             <a:r>
-              <a:rPr lang="en-US" sz="1600" dirty="0" err="1"/>
+              <a:rPr lang="en-US" sz="900" dirty="0" err="1"/>
               <a:t>polyhedra</a:t>
             </a:r>
-            <a:endParaRPr lang="en-US" sz="1600" u="sng" dirty="0"/>
+            <a:endParaRPr lang="en-US" sz="900" u="sng" dirty="0"/>
           </a:p>
         </p:txBody>
       </p:sp>
@@ -3864,8 +3863,8 @@
         </p:nvCxnSpPr>
         <p:spPr>
           <a:xfrm>
-            <a:off x="19607050" y="6920522"/>
-            <a:ext cx="0" cy="457197"/>
+            <a:off x="11028966" y="12227169"/>
+            <a:ext cx="0" cy="257173"/>
           </a:xfrm>
           <a:prstGeom prst="straightConnector1">
             <a:avLst/>
@@ -3906,8 +3905,8 @@
         </p:nvSpPr>
         <p:spPr>
           <a:xfrm>
-            <a:off x="17429502" y="4324378"/>
-            <a:ext cx="4355096" cy="1198882"/>
+            <a:off x="9804095" y="10766838"/>
+            <a:ext cx="2449742" cy="674371"/>
           </a:xfrm>
           <a:prstGeom prst="roundRect">
             <a:avLst/>
@@ -3941,7 +3940,7 @@
           <a:p>
             <a:pPr algn="ctr"/>
             <a:r>
-              <a:rPr lang="en-US" sz="1600" dirty="0"/>
+              <a:rPr lang="en-US" sz="900" dirty="0"/>
               <a:t>Lemma 2: Power diagram induced by (full support) convex combination of polyhedral  functions is same</a:t>
             </a:r>
           </a:p>
@@ -3965,8 +3964,8 @@
         </p:nvCxnSpPr>
         <p:spPr>
           <a:xfrm>
-            <a:off x="19607050" y="5523260"/>
-            <a:ext cx="0" cy="251780"/>
+            <a:off x="11028966" y="11441209"/>
+            <a:ext cx="0" cy="141626"/>
           </a:xfrm>
           <a:prstGeom prst="straightConnector1">
             <a:avLst/>
@@ -4011,8 +4010,8 @@
         </p:nvCxnSpPr>
         <p:spPr>
           <a:xfrm flipH="1">
-            <a:off x="4071569" y="4140435"/>
-            <a:ext cx="8143175" cy="1495605"/>
+            <a:off x="2290258" y="10663370"/>
+            <a:ext cx="4580536" cy="841278"/>
           </a:xfrm>
           <a:prstGeom prst="straightConnector1">
             <a:avLst/>
@@ -4057,8 +4056,8 @@
         </p:nvCxnSpPr>
         <p:spPr>
           <a:xfrm flipH="1">
-            <a:off x="8643752" y="4140435"/>
-            <a:ext cx="3570992" cy="1497173"/>
+            <a:off x="4862111" y="10663370"/>
+            <a:ext cx="2008683" cy="842160"/>
           </a:xfrm>
           <a:prstGeom prst="straightConnector1">
             <a:avLst/>
@@ -4099,8 +4098,8 @@
         </p:nvSpPr>
         <p:spPr>
           <a:xfrm>
-            <a:off x="18234671" y="2583403"/>
-            <a:ext cx="4355096" cy="1198882"/>
+            <a:off x="10257002" y="9787539"/>
+            <a:ext cx="2449742" cy="674371"/>
           </a:xfrm>
           <a:prstGeom prst="roundRect">
             <a:avLst/>
@@ -4134,7 +4133,7 @@
           <a:p>
             <a:pPr algn="ctr"/>
             <a:r>
-              <a:rPr lang="en-US" sz="1600" dirty="0"/>
+              <a:rPr lang="en-US" sz="900" dirty="0"/>
               <a:t>Lemma 6: Negative Bayes risk is polyhedral and projection forms power diagram</a:t>
             </a:r>
           </a:p>
@@ -4158,8 +4157,8 @@
         </p:nvCxnSpPr>
         <p:spPr>
           <a:xfrm>
-            <a:off x="17463720" y="1567412"/>
-            <a:ext cx="2948499" cy="1015991"/>
+            <a:off x="9823343" y="9216045"/>
+            <a:ext cx="1658531" cy="571495"/>
           </a:xfrm>
           <a:prstGeom prst="straightConnector1">
             <a:avLst/>
@@ -4200,8 +4199,8 @@
         </p:nvSpPr>
         <p:spPr>
           <a:xfrm>
-            <a:off x="6547009" y="8035372"/>
-            <a:ext cx="4355096" cy="1198882"/>
+            <a:off x="3682692" y="12854272"/>
+            <a:ext cx="2449742" cy="674371"/>
           </a:xfrm>
           <a:prstGeom prst="roundRect">
             <a:avLst/>
@@ -4235,7 +4234,7 @@
           <a:p>
             <a:pPr algn="ctr"/>
             <a:r>
-              <a:rPr lang="en-US" sz="1600" dirty="0"/>
+              <a:rPr lang="en-US" sz="900" dirty="0"/>
               <a:t>Lemma 7:Embedding property implies level sets are same up to trim</a:t>
             </a:r>
           </a:p>
@@ -4259,8 +4258,8 @@
         </p:nvCxnSpPr>
         <p:spPr>
           <a:xfrm>
-            <a:off x="8643752" y="6836490"/>
-            <a:ext cx="80805" cy="1198882"/>
+            <a:off x="4862111" y="12179901"/>
+            <a:ext cx="45453" cy="674371"/>
           </a:xfrm>
           <a:prstGeom prst="straightConnector1">
             <a:avLst/>
@@ -4305,8 +4304,8 @@
         </p:nvCxnSpPr>
         <p:spPr>
           <a:xfrm flipH="1">
-            <a:off x="8724557" y="4140435"/>
-            <a:ext cx="3490187" cy="3894937"/>
+            <a:off x="4907564" y="10663370"/>
+            <a:ext cx="1963230" cy="2190902"/>
           </a:xfrm>
           <a:prstGeom prst="straightConnector1">
             <a:avLst/>
@@ -4347,8 +4346,8 @@
         </p:nvSpPr>
         <p:spPr>
           <a:xfrm>
-            <a:off x="6466204" y="5637608"/>
-            <a:ext cx="4355096" cy="1198882"/>
+            <a:off x="3637240" y="11505530"/>
+            <a:ext cx="2449742" cy="674371"/>
           </a:xfrm>
           <a:prstGeom prst="roundRect">
             <a:avLst/>
@@ -4382,7 +4381,7 @@
           <a:p>
             <a:pPr algn="ctr"/>
             <a:r>
-              <a:rPr lang="en-US" sz="1600" dirty="0"/>
+              <a:rPr lang="en-US" sz="900" dirty="0"/>
               <a:t>Lemma 5: property embedding implies loss embedding</a:t>
             </a:r>
           </a:p>
@@ -4402,8 +4401,8 @@
         </p:nvSpPr>
         <p:spPr>
           <a:xfrm>
-            <a:off x="2406731" y="10514542"/>
-            <a:ext cx="4355096" cy="1198882"/>
+            <a:off x="1353786" y="14248805"/>
+            <a:ext cx="2449742" cy="674371"/>
           </a:xfrm>
           <a:prstGeom prst="roundRect">
             <a:avLst/>
@@ -4437,7 +4436,7 @@
           <a:p>
             <a:pPr algn="ctr"/>
             <a:r>
-              <a:rPr lang="en-US" sz="1600" dirty="0"/>
+              <a:rPr lang="en-US" sz="900" dirty="0"/>
               <a:t>Prop 3: TFAE: Embed finite prop, trim finite, finite set of FDLS</a:t>
             </a:r>
           </a:p>
@@ -4461,8 +4460,8 @@
         </p:nvCxnSpPr>
         <p:spPr>
           <a:xfrm flipH="1">
-            <a:off x="4584279" y="9234254"/>
-            <a:ext cx="4140278" cy="1280288"/>
+            <a:off x="2578657" y="13528643"/>
+            <a:ext cx="2328906" cy="720162"/>
           </a:xfrm>
           <a:prstGeom prst="straightConnector1">
             <a:avLst/>
@@ -4503,8 +4502,8 @@
         </p:nvSpPr>
         <p:spPr>
           <a:xfrm>
-            <a:off x="17961664" y="10615007"/>
-            <a:ext cx="4355096" cy="1198882"/>
+            <a:off x="10103436" y="14305317"/>
+            <a:ext cx="2449742" cy="674371"/>
           </a:xfrm>
           <a:prstGeom prst="roundRect">
             <a:avLst/>
@@ -4538,15 +4537,15 @@
           <a:p>
             <a:pPr algn="ctr"/>
             <a:r>
-              <a:rPr lang="en-US" sz="1600" dirty="0"/>
+              <a:rPr lang="en-US" sz="900" dirty="0"/>
               <a:t>Theorem 5: Poly loss embeds finite prop. Moreover, poly loss indirectly elicits prop </a:t>
             </a:r>
             <a:r>
-              <a:rPr lang="en-US" sz="1600" dirty="0" err="1"/>
+              <a:rPr lang="en-US" sz="900" dirty="0" err="1"/>
               <a:t>iff</a:t>
             </a:r>
             <a:r>
-              <a:rPr lang="en-US" sz="1600" dirty="0"/>
+              <a:rPr lang="en-US" sz="900" dirty="0"/>
               <a:t> it embeds a property refining the original</a:t>
             </a:r>
           </a:p>
@@ -4570,8 +4569,8 @@
         </p:nvCxnSpPr>
         <p:spPr>
           <a:xfrm>
-            <a:off x="16987451" y="9891975"/>
-            <a:ext cx="3151761" cy="723032"/>
+            <a:off x="9555441" y="13898611"/>
+            <a:ext cx="1772866" cy="406706"/>
           </a:xfrm>
           <a:prstGeom prst="straightConnector1">
             <a:avLst/>
@@ -4612,8 +4611,8 @@
         </p:nvSpPr>
         <p:spPr>
           <a:xfrm>
-            <a:off x="14809902" y="12458927"/>
-            <a:ext cx="4355096" cy="1198882"/>
+            <a:off x="8330570" y="15342522"/>
+            <a:ext cx="2449742" cy="674371"/>
           </a:xfrm>
           <a:prstGeom prst="roundRect">
             <a:avLst/>
@@ -4647,7 +4646,7 @@
           <a:p>
             <a:pPr algn="ctr"/>
             <a:r>
-              <a:rPr lang="en-US" sz="1600" dirty="0"/>
+              <a:rPr lang="en-US" sz="900" dirty="0"/>
               <a:t>Theorem 6: Poly loss indirectly elicits implies consistent</a:t>
             </a:r>
           </a:p>
@@ -4671,8 +4670,8 @@
         </p:nvCxnSpPr>
         <p:spPr>
           <a:xfrm flipH="1">
-            <a:off x="16987450" y="11813889"/>
-            <a:ext cx="3151762" cy="645038"/>
+            <a:off x="9555441" y="14979688"/>
+            <a:ext cx="1772866" cy="362834"/>
           </a:xfrm>
           <a:prstGeom prst="straightConnector1">
             <a:avLst/>
@@ -4713,8 +4712,8 @@
         </p:nvSpPr>
         <p:spPr>
           <a:xfrm>
-            <a:off x="11543580" y="10602324"/>
-            <a:ext cx="4355096" cy="1198882"/>
+            <a:off x="6493264" y="14298182"/>
+            <a:ext cx="2449742" cy="674371"/>
           </a:xfrm>
           <a:prstGeom prst="roundRect">
             <a:avLst/>
@@ -4748,7 +4747,7 @@
           <a:p>
             <a:pPr algn="ctr"/>
             <a:r>
-              <a:rPr lang="en-US" sz="1600" dirty="0"/>
+              <a:rPr lang="en-US" sz="900" dirty="0"/>
               <a:t>Theorem 4: Embedding implies calibration</a:t>
             </a:r>
           </a:p>
@@ -4772,8 +4771,8 @@
         </p:nvCxnSpPr>
         <p:spPr>
           <a:xfrm>
-            <a:off x="13721128" y="11801206"/>
-            <a:ext cx="3266322" cy="657721"/>
+            <a:off x="7718135" y="14972554"/>
+            <a:ext cx="1837306" cy="369968"/>
           </a:xfrm>
           <a:prstGeom prst="straightConnector1">
             <a:avLst/>
@@ -4818,8 +4817,8 @@
         </p:nvCxnSpPr>
         <p:spPr>
           <a:xfrm flipH="1">
-            <a:off x="13721128" y="9891975"/>
-            <a:ext cx="3266323" cy="710349"/>
+            <a:off x="7718135" y="13898611"/>
+            <a:ext cx="1837307" cy="399571"/>
           </a:xfrm>
           <a:prstGeom prst="straightConnector1">
             <a:avLst/>
@@ -4860,8 +4859,8 @@
         </p:nvSpPr>
         <p:spPr>
           <a:xfrm rot="3060572">
-            <a:off x="12617397" y="4764984"/>
-            <a:ext cx="2436320" cy="2452682"/>
+            <a:off x="7097286" y="11014678"/>
+            <a:ext cx="1370430" cy="1379634"/>
           </a:xfrm>
           <a:prstGeom prst="plus">
             <a:avLst>
@@ -4896,7 +4895,7 @@
           <a:lstStyle/>
           <a:p>
             <a:pPr algn="ctr"/>
-            <a:endParaRPr lang="en-US"/>
+            <a:endParaRPr lang="en-US" sz="1013"/>
           </a:p>
         </p:txBody>
       </p:sp>
@@ -4918,8 +4917,8 @@
         </p:nvCxnSpPr>
         <p:spPr>
           <a:xfrm flipH="1">
-            <a:off x="16987451" y="1567412"/>
-            <a:ext cx="476269" cy="7396936"/>
+            <a:off x="9555442" y="9216044"/>
+            <a:ext cx="267901" cy="4160777"/>
           </a:xfrm>
           <a:prstGeom prst="straightConnector1">
             <a:avLst/>
@@ -4960,8 +4959,8 @@
         </p:nvSpPr>
         <p:spPr>
           <a:xfrm rot="3060572">
-            <a:off x="14786923" y="7135697"/>
-            <a:ext cx="1359561" cy="1471066"/>
+            <a:off x="8317645" y="12348204"/>
+            <a:ext cx="764753" cy="827475"/>
           </a:xfrm>
           <a:prstGeom prst="plus">
             <a:avLst>
@@ -4996,7 +4995,7 @@
           <a:lstStyle/>
           <a:p>
             <a:pPr algn="ctr"/>
-            <a:endParaRPr lang="en-US"/>
+            <a:endParaRPr lang="en-US" sz="1013"/>
           </a:p>
         </p:txBody>
       </p:sp>
@@ -5032,10 +5031,10 @@
       </p:grpSpPr>
       <p:sp>
         <p:nvSpPr>
-          <p:cNvPr id="4" name="Rectangle: Rounded Corners 3">
-            <a:extLst>
-              <a:ext uri="{FF2B5EF4-FFF2-40B4-BE49-F238E27FC236}">
-                <a16:creationId xmlns:a16="http://schemas.microsoft.com/office/drawing/2014/main" id="{5283EF00-AC17-4142-A880-694C5177FF7D}"/>
+          <p:cNvPr id="262" name="Rectangle: Rounded Corners 261">
+            <a:extLst>
+              <a:ext uri="{FF2B5EF4-FFF2-40B4-BE49-F238E27FC236}">
+                <a16:creationId xmlns:a16="http://schemas.microsoft.com/office/drawing/2014/main" id="{6A26FAFC-E5DE-4E5B-961B-FC6CBBE7DB5C}"/>
               </a:ext>
             </a:extLst>
           </p:cNvPr>
@@ -5044,12 +5043,18 @@
         </p:nvSpPr>
         <p:spPr>
           <a:xfrm>
-            <a:off x="2194560" y="575102"/>
-            <a:ext cx="4355096" cy="1198882"/>
+            <a:off x="1399791" y="15568694"/>
+            <a:ext cx="4783871" cy="1860884"/>
           </a:xfrm>
           <a:prstGeom prst="roundRect">
             <a:avLst/>
           </a:prstGeom>
+          <a:solidFill>
+            <a:srgbClr val="A7E0FF"/>
+          </a:solidFill>
+          <a:ln>
+            <a:noFill/>
+          </a:ln>
         </p:spPr>
         <p:style>
           <a:lnRef idx="2">
@@ -5072,19 +5077,16 @@
           <a:lstStyle/>
           <a:p>
             <a:pPr algn="ctr"/>
-            <a:r>
-              <a:rPr lang="en-US" sz="1600" dirty="0"/>
-              <a:t>Section 3: Embeddings and Polyhedral Losses</a:t>
-            </a:r>
-          </a:p>
-        </p:txBody>
-      </p:sp>
-      <p:sp>
-        <p:nvSpPr>
-          <p:cNvPr id="27" name="Rectangle: Rounded Corners 26">
-            <a:extLst>
-              <a:ext uri="{FF2B5EF4-FFF2-40B4-BE49-F238E27FC236}">
-                <a16:creationId xmlns:a16="http://schemas.microsoft.com/office/drawing/2014/main" id="{DFA8178D-4AEF-4B40-9E6E-7C72CCB7DCDD}"/>
+            <a:endParaRPr lang="en-US"/>
+          </a:p>
+        </p:txBody>
+      </p:sp>
+      <p:sp>
+        <p:nvSpPr>
+          <p:cNvPr id="260" name="Rectangle: Rounded Corners 259">
+            <a:extLst>
+              <a:ext uri="{FF2B5EF4-FFF2-40B4-BE49-F238E27FC236}">
+                <a16:creationId xmlns:a16="http://schemas.microsoft.com/office/drawing/2014/main" id="{E754A918-E964-404D-862A-84CAE05F64C9}"/>
               </a:ext>
             </a:extLst>
           </p:cNvPr>
@@ -5093,14 +5095,14 @@
         </p:nvSpPr>
         <p:spPr>
           <a:xfrm>
-            <a:off x="8681017" y="2318841"/>
-            <a:ext cx="4355096" cy="1145482"/>
+            <a:off x="9247396" y="7446681"/>
+            <a:ext cx="4099636" cy="11258414"/>
           </a:xfrm>
           <a:prstGeom prst="roundRect">
             <a:avLst/>
           </a:prstGeom>
           <a:solidFill>
-            <a:schemeClr val="accent2"/>
+            <a:srgbClr val="CA92FC"/>
           </a:solidFill>
           <a:ln>
             <a:noFill/>
@@ -5127,19 +5129,16 @@
           <a:lstStyle/>
           <a:p>
             <a:pPr algn="ctr"/>
-            <a:r>
-              <a:rPr lang="en-US" sz="1600" dirty="0"/>
-              <a:t>Appendix B </a:t>
-            </a:r>
-          </a:p>
-        </p:txBody>
-      </p:sp>
-      <p:sp>
-        <p:nvSpPr>
-          <p:cNvPr id="58" name="Rectangle: Rounded Corners 57">
-            <a:extLst>
-              <a:ext uri="{FF2B5EF4-FFF2-40B4-BE49-F238E27FC236}">
-                <a16:creationId xmlns:a16="http://schemas.microsoft.com/office/drawing/2014/main" id="{C5AA6F6B-0ED4-448D-85BE-1926F65A65AF}"/>
+            <a:endParaRPr lang="en-US"/>
+          </a:p>
+        </p:txBody>
+      </p:sp>
+      <p:sp>
+        <p:nvSpPr>
+          <p:cNvPr id="251" name="Rectangle: Rounded Corners 250">
+            <a:extLst>
+              <a:ext uri="{FF2B5EF4-FFF2-40B4-BE49-F238E27FC236}">
+                <a16:creationId xmlns:a16="http://schemas.microsoft.com/office/drawing/2014/main" id="{E8FC44DF-539D-474B-B01C-1B7A37CB4A62}"/>
               </a:ext>
             </a:extLst>
           </p:cNvPr>
@@ -5148,14 +5147,585 @@
         </p:nvSpPr>
         <p:spPr>
           <a:xfrm>
-            <a:off x="8681017" y="575102"/>
-            <a:ext cx="4355096" cy="1198882"/>
+            <a:off x="-105255" y="5951621"/>
+            <a:ext cx="9130323" cy="9053232"/>
           </a:xfrm>
           <a:prstGeom prst="roundRect">
             <a:avLst/>
           </a:prstGeom>
           <a:solidFill>
-            <a:schemeClr val="accent4"/>
+            <a:schemeClr val="accent1">
+              <a:lumMod val="20000"/>
+              <a:lumOff val="80000"/>
+            </a:schemeClr>
+          </a:solidFill>
+          <a:ln>
+            <a:solidFill>
+              <a:schemeClr val="accent1">
+                <a:lumMod val="20000"/>
+                <a:lumOff val="80000"/>
+              </a:schemeClr>
+            </a:solidFill>
+          </a:ln>
+        </p:spPr>
+        <p:style>
+          <a:lnRef idx="2">
+            <a:schemeClr val="accent1">
+              <a:shade val="50000"/>
+            </a:schemeClr>
+          </a:lnRef>
+          <a:fillRef idx="1">
+            <a:schemeClr val="accent1"/>
+          </a:fillRef>
+          <a:effectRef idx="0">
+            <a:schemeClr val="accent1"/>
+          </a:effectRef>
+          <a:fontRef idx="minor">
+            <a:schemeClr val="lt1"/>
+          </a:fontRef>
+        </p:style>
+        <p:txBody>
+          <a:bodyPr rtlCol="0" anchor="ctr"/>
+          <a:lstStyle/>
+          <a:p>
+            <a:pPr algn="ctr"/>
+            <a:endParaRPr lang="en-US" dirty="0"/>
+          </a:p>
+        </p:txBody>
+      </p:sp>
+      <p:cxnSp>
+        <p:nvCxnSpPr>
+          <p:cNvPr id="42" name="Straight Arrow Connector 41">
+            <a:extLst>
+              <a:ext uri="{FF2B5EF4-FFF2-40B4-BE49-F238E27FC236}">
+                <a16:creationId xmlns:a16="http://schemas.microsoft.com/office/drawing/2014/main" id="{9B2E0340-93F6-4B61-8675-5453AB5BE8A9}"/>
+              </a:ext>
+            </a:extLst>
+          </p:cNvPr>
+          <p:cNvCxnSpPr>
+            <a:cxnSpLocks/>
+            <a:stCxn id="11" idx="2"/>
+            <a:endCxn id="7" idx="0"/>
+          </p:cNvCxnSpPr>
+          <p:nvPr/>
+        </p:nvCxnSpPr>
+        <p:spPr>
+          <a:xfrm flipH="1">
+            <a:off x="3263301" y="7761780"/>
+            <a:ext cx="225071" cy="5110008"/>
+          </a:xfrm>
+          <a:prstGeom prst="straightConnector1">
+            <a:avLst/>
+          </a:prstGeom>
+          <a:ln w="38100">
+            <a:solidFill>
+              <a:schemeClr val="tx1"/>
+            </a:solidFill>
+            <a:tailEnd type="triangle"/>
+          </a:ln>
+        </p:spPr>
+        <p:style>
+          <a:lnRef idx="1">
+            <a:schemeClr val="accent1"/>
+          </a:lnRef>
+          <a:fillRef idx="0">
+            <a:schemeClr val="accent1"/>
+          </a:fillRef>
+          <a:effectRef idx="0">
+            <a:schemeClr val="accent1"/>
+          </a:effectRef>
+          <a:fontRef idx="minor">
+            <a:schemeClr val="tx1"/>
+          </a:fontRef>
+        </p:style>
+      </p:cxnSp>
+      <p:cxnSp>
+        <p:nvCxnSpPr>
+          <p:cNvPr id="39" name="Straight Arrow Connector 38">
+            <a:extLst>
+              <a:ext uri="{FF2B5EF4-FFF2-40B4-BE49-F238E27FC236}">
+                <a16:creationId xmlns:a16="http://schemas.microsoft.com/office/drawing/2014/main" id="{53C0E3DE-AE3B-482C-9772-1C62347502F9}"/>
+              </a:ext>
+            </a:extLst>
+          </p:cNvPr>
+          <p:cNvCxnSpPr>
+            <a:cxnSpLocks/>
+            <a:stCxn id="11" idx="2"/>
+            <a:endCxn id="58" idx="0"/>
+          </p:cNvCxnSpPr>
+          <p:nvPr/>
+        </p:nvCxnSpPr>
+        <p:spPr>
+          <a:xfrm flipH="1">
+            <a:off x="1149794" y="7761780"/>
+            <a:ext cx="2338578" cy="2112000"/>
+          </a:xfrm>
+          <a:prstGeom prst="straightConnector1">
+            <a:avLst/>
+          </a:prstGeom>
+          <a:ln w="38100">
+            <a:solidFill>
+              <a:schemeClr val="tx1"/>
+            </a:solidFill>
+            <a:tailEnd type="triangle"/>
+          </a:ln>
+        </p:spPr>
+        <p:style>
+          <a:lnRef idx="1">
+            <a:schemeClr val="accent1"/>
+          </a:lnRef>
+          <a:fillRef idx="0">
+            <a:schemeClr val="accent1"/>
+          </a:fillRef>
+          <a:effectRef idx="0">
+            <a:schemeClr val="accent1"/>
+          </a:effectRef>
+          <a:fontRef idx="minor">
+            <a:schemeClr val="tx1"/>
+          </a:fontRef>
+        </p:style>
+      </p:cxnSp>
+      <p:cxnSp>
+        <p:nvCxnSpPr>
+          <p:cNvPr id="118" name="Straight Arrow Connector 117">
+            <a:extLst>
+              <a:ext uri="{FF2B5EF4-FFF2-40B4-BE49-F238E27FC236}">
+                <a16:creationId xmlns:a16="http://schemas.microsoft.com/office/drawing/2014/main" id="{4A6AFABA-3C39-436D-8928-3CF1964E53F2}"/>
+              </a:ext>
+            </a:extLst>
+          </p:cNvPr>
+          <p:cNvCxnSpPr>
+            <a:cxnSpLocks/>
+            <a:stCxn id="73" idx="2"/>
+            <a:endCxn id="117" idx="0"/>
+          </p:cNvCxnSpPr>
+          <p:nvPr/>
+        </p:nvCxnSpPr>
+        <p:spPr>
+          <a:xfrm>
+            <a:off x="10901562" y="10434251"/>
+            <a:ext cx="53008" cy="2284956"/>
+          </a:xfrm>
+          <a:prstGeom prst="straightConnector1">
+            <a:avLst/>
+          </a:prstGeom>
+          <a:ln w="38100">
+            <a:solidFill>
+              <a:schemeClr val="tx1"/>
+            </a:solidFill>
+            <a:tailEnd type="triangle"/>
+          </a:ln>
+        </p:spPr>
+        <p:style>
+          <a:lnRef idx="1">
+            <a:schemeClr val="accent1"/>
+          </a:lnRef>
+          <a:fillRef idx="0">
+            <a:schemeClr val="accent1"/>
+          </a:fillRef>
+          <a:effectRef idx="0">
+            <a:schemeClr val="accent1"/>
+          </a:effectRef>
+          <a:fontRef idx="minor">
+            <a:schemeClr val="tx1"/>
+          </a:fontRef>
+        </p:style>
+      </p:cxnSp>
+      <p:cxnSp>
+        <p:nvCxnSpPr>
+          <p:cNvPr id="126" name="Straight Arrow Connector 125">
+            <a:extLst>
+              <a:ext uri="{FF2B5EF4-FFF2-40B4-BE49-F238E27FC236}">
+                <a16:creationId xmlns:a16="http://schemas.microsoft.com/office/drawing/2014/main" id="{85F1556E-E689-4799-B1F0-0AAFDCFB5643}"/>
+              </a:ext>
+            </a:extLst>
+          </p:cNvPr>
+          <p:cNvCxnSpPr>
+            <a:cxnSpLocks/>
+            <a:stCxn id="4" idx="2"/>
+            <a:endCxn id="117" idx="0"/>
+          </p:cNvCxnSpPr>
+          <p:nvPr/>
+        </p:nvCxnSpPr>
+        <p:spPr>
+          <a:xfrm>
+            <a:off x="6987186" y="6794779"/>
+            <a:ext cx="3967384" cy="5924428"/>
+          </a:xfrm>
+          <a:prstGeom prst="straightConnector1">
+            <a:avLst/>
+          </a:prstGeom>
+          <a:ln w="38100">
+            <a:solidFill>
+              <a:schemeClr val="tx1"/>
+            </a:solidFill>
+            <a:tailEnd type="triangle"/>
+          </a:ln>
+        </p:spPr>
+        <p:style>
+          <a:lnRef idx="1">
+            <a:schemeClr val="accent1"/>
+          </a:lnRef>
+          <a:fillRef idx="0">
+            <a:schemeClr val="accent1"/>
+          </a:fillRef>
+          <a:effectRef idx="0">
+            <a:schemeClr val="accent1"/>
+          </a:effectRef>
+          <a:fontRef idx="minor">
+            <a:schemeClr val="tx1"/>
+          </a:fontRef>
+        </p:style>
+      </p:cxnSp>
+      <p:sp>
+        <p:nvSpPr>
+          <p:cNvPr id="4" name="Rectangle: Rounded Corners 3">
+            <a:extLst>
+              <a:ext uri="{FF2B5EF4-FFF2-40B4-BE49-F238E27FC236}">
+                <a16:creationId xmlns:a16="http://schemas.microsoft.com/office/drawing/2014/main" id="{5283EF00-AC17-4142-A880-694C5177FF7D}"/>
+              </a:ext>
+            </a:extLst>
+          </p:cNvPr>
+          <p:cNvSpPr/>
+          <p:nvPr/>
+        </p:nvSpPr>
+        <p:spPr>
+          <a:xfrm>
+            <a:off x="5762315" y="6120408"/>
+            <a:ext cx="2449742" cy="674371"/>
+          </a:xfrm>
+          <a:prstGeom prst="roundRect">
+            <a:avLst/>
+          </a:prstGeom>
+        </p:spPr>
+        <p:style>
+          <a:lnRef idx="2">
+            <a:schemeClr val="accent1">
+              <a:shade val="50000"/>
+            </a:schemeClr>
+          </a:lnRef>
+          <a:fillRef idx="1">
+            <a:schemeClr val="accent1"/>
+          </a:fillRef>
+          <a:effectRef idx="0">
+            <a:schemeClr val="accent1"/>
+          </a:effectRef>
+          <a:fontRef idx="minor">
+            <a:schemeClr val="lt1"/>
+          </a:fontRef>
+        </p:style>
+        <p:txBody>
+          <a:bodyPr rtlCol="0" anchor="ctr"/>
+          <a:lstStyle/>
+          <a:p>
+            <a:pPr algn="ctr"/>
+            <a:r>
+              <a:rPr lang="en-US" sz="900" dirty="0"/>
+              <a:t>Lemma 1: Bayes Risks of L and L|_R2 are equal</a:t>
+            </a:r>
+          </a:p>
+        </p:txBody>
+      </p:sp>
+      <p:sp>
+        <p:nvSpPr>
+          <p:cNvPr id="5" name="Rectangle: Rounded Corners 4">
+            <a:extLst>
+              <a:ext uri="{FF2B5EF4-FFF2-40B4-BE49-F238E27FC236}">
+                <a16:creationId xmlns:a16="http://schemas.microsoft.com/office/drawing/2014/main" id="{FF512C66-5BEE-4383-8CC8-4372F1340E5E}"/>
+              </a:ext>
+            </a:extLst>
+          </p:cNvPr>
+          <p:cNvSpPr/>
+          <p:nvPr/>
+        </p:nvSpPr>
+        <p:spPr>
+          <a:xfrm>
+            <a:off x="5332046" y="8208882"/>
+            <a:ext cx="2449742" cy="624396"/>
+          </a:xfrm>
+          <a:prstGeom prst="roundRect">
+            <a:avLst/>
+          </a:prstGeom>
+        </p:spPr>
+        <p:style>
+          <a:lnRef idx="2">
+            <a:schemeClr val="accent1">
+              <a:shade val="50000"/>
+            </a:schemeClr>
+          </a:lnRef>
+          <a:fillRef idx="1">
+            <a:schemeClr val="accent1"/>
+          </a:fillRef>
+          <a:effectRef idx="0">
+            <a:schemeClr val="accent1"/>
+          </a:effectRef>
+          <a:fontRef idx="minor">
+            <a:schemeClr val="lt1"/>
+          </a:fontRef>
+        </p:style>
+        <p:txBody>
+          <a:bodyPr rtlCol="0" anchor="ctr"/>
+          <a:lstStyle/>
+          <a:p>
+            <a:pPr algn="ctr"/>
+            <a:r>
+              <a:rPr lang="en-US" sz="900" dirty="0"/>
+              <a:t>Prop 1: L embeds ell </a:t>
+            </a:r>
+            <a:r>
+              <a:rPr lang="en-US" sz="900" dirty="0" err="1"/>
+              <a:t>iff</a:t>
+            </a:r>
+            <a:r>
+              <a:rPr lang="en-US" sz="900" dirty="0"/>
+              <a:t> </a:t>
+            </a:r>
+            <a:r>
+              <a:rPr lang="en-US" sz="900" u="sng" dirty="0"/>
+              <a:t>L</a:t>
+            </a:r>
+            <a:r>
+              <a:rPr lang="en-US" sz="900" dirty="0"/>
+              <a:t> = </a:t>
+            </a:r>
+            <a:r>
+              <a:rPr lang="en-US" sz="900" u="sng" dirty="0"/>
+              <a:t>ell</a:t>
+            </a:r>
+          </a:p>
+        </p:txBody>
+      </p:sp>
+      <p:sp>
+        <p:nvSpPr>
+          <p:cNvPr id="6" name="Rectangle: Rounded Corners 5">
+            <a:extLst>
+              <a:ext uri="{FF2B5EF4-FFF2-40B4-BE49-F238E27FC236}">
+                <a16:creationId xmlns:a16="http://schemas.microsoft.com/office/drawing/2014/main" id="{8FF873D4-8529-4649-81BA-921CE0A1849C}"/>
+              </a:ext>
+            </a:extLst>
+          </p:cNvPr>
+          <p:cNvSpPr/>
+          <p:nvPr/>
+        </p:nvSpPr>
+        <p:spPr>
+          <a:xfrm>
+            <a:off x="2666820" y="9127490"/>
+            <a:ext cx="2736821" cy="594359"/>
+          </a:xfrm>
+          <a:prstGeom prst="roundRect">
+            <a:avLst/>
+          </a:prstGeom>
+        </p:spPr>
+        <p:style>
+          <a:lnRef idx="2">
+            <a:schemeClr val="accent1">
+              <a:shade val="50000"/>
+            </a:schemeClr>
+          </a:lnRef>
+          <a:fillRef idx="1">
+            <a:schemeClr val="accent1"/>
+          </a:fillRef>
+          <a:effectRef idx="0">
+            <a:schemeClr val="accent1"/>
+          </a:effectRef>
+          <a:fontRef idx="minor">
+            <a:schemeClr val="lt1"/>
+          </a:fontRef>
+        </p:style>
+        <p:txBody>
+          <a:bodyPr rtlCol="0" anchor="ctr"/>
+          <a:lstStyle/>
+          <a:p>
+            <a:pPr algn="ctr"/>
+            <a:r>
+              <a:rPr lang="en-US" sz="900" dirty="0"/>
+              <a:t>Prop 2: L embeds discrete loss </a:t>
+            </a:r>
+            <a:r>
+              <a:rPr lang="en-US" sz="900" dirty="0" err="1"/>
+              <a:t>iff</a:t>
+            </a:r>
+            <a:r>
+              <a:rPr lang="en-US" sz="900" dirty="0"/>
+              <a:t> </a:t>
+            </a:r>
+            <a:r>
+              <a:rPr lang="en-US" sz="900" u="sng" dirty="0"/>
+              <a:t>L</a:t>
+            </a:r>
+            <a:r>
+              <a:rPr lang="en-US" sz="900" dirty="0"/>
+              <a:t> polyhedral</a:t>
+            </a:r>
+          </a:p>
+        </p:txBody>
+      </p:sp>
+      <p:sp>
+        <p:nvSpPr>
+          <p:cNvPr id="7" name="Rectangle: Rounded Corners 6">
+            <a:extLst>
+              <a:ext uri="{FF2B5EF4-FFF2-40B4-BE49-F238E27FC236}">
+                <a16:creationId xmlns:a16="http://schemas.microsoft.com/office/drawing/2014/main" id="{6624E8D3-0FE2-40CA-A231-FD009056A768}"/>
+              </a:ext>
+            </a:extLst>
+          </p:cNvPr>
+          <p:cNvSpPr/>
+          <p:nvPr/>
+        </p:nvSpPr>
+        <p:spPr>
+          <a:xfrm>
+            <a:off x="1978622" y="12871788"/>
+            <a:ext cx="2569358" cy="521790"/>
+          </a:xfrm>
+          <a:prstGeom prst="roundRect">
+            <a:avLst/>
+          </a:prstGeom>
+        </p:spPr>
+        <p:style>
+          <a:lnRef idx="2">
+            <a:schemeClr val="accent1">
+              <a:shade val="50000"/>
+            </a:schemeClr>
+          </a:lnRef>
+          <a:fillRef idx="1">
+            <a:schemeClr val="accent1"/>
+          </a:fillRef>
+          <a:effectRef idx="0">
+            <a:schemeClr val="accent1"/>
+          </a:effectRef>
+          <a:fontRef idx="minor">
+            <a:schemeClr val="lt1"/>
+          </a:fontRef>
+        </p:style>
+        <p:txBody>
+          <a:bodyPr rtlCol="0" anchor="ctr"/>
+          <a:lstStyle/>
+          <a:p>
+            <a:pPr algn="ctr"/>
+            <a:r>
+              <a:rPr lang="en-US" sz="900" dirty="0"/>
+              <a:t>Theorem 2: Every polyhedral L embeds a discrete loss</a:t>
+            </a:r>
+          </a:p>
+        </p:txBody>
+      </p:sp>
+      <p:sp>
+        <p:nvSpPr>
+          <p:cNvPr id="8" name="Rectangle: Rounded Corners 7">
+            <a:extLst>
+              <a:ext uri="{FF2B5EF4-FFF2-40B4-BE49-F238E27FC236}">
+                <a16:creationId xmlns:a16="http://schemas.microsoft.com/office/drawing/2014/main" id="{634B0AFE-2E33-4642-B647-C1B20EF6C0B2}"/>
+              </a:ext>
+            </a:extLst>
+          </p:cNvPr>
+          <p:cNvSpPr/>
+          <p:nvPr/>
+        </p:nvSpPr>
+        <p:spPr>
+          <a:xfrm>
+            <a:off x="5351029" y="13343603"/>
+            <a:ext cx="2252906" cy="644334"/>
+          </a:xfrm>
+          <a:prstGeom prst="roundRect">
+            <a:avLst/>
+          </a:prstGeom>
+        </p:spPr>
+        <p:style>
+          <a:lnRef idx="2">
+            <a:schemeClr val="accent1">
+              <a:shade val="50000"/>
+            </a:schemeClr>
+          </a:lnRef>
+          <a:fillRef idx="1">
+            <a:schemeClr val="accent1"/>
+          </a:fillRef>
+          <a:effectRef idx="0">
+            <a:schemeClr val="accent1"/>
+          </a:effectRef>
+          <a:fontRef idx="minor">
+            <a:schemeClr val="lt1"/>
+          </a:fontRef>
+        </p:style>
+        <p:txBody>
+          <a:bodyPr rtlCol="0" anchor="ctr"/>
+          <a:lstStyle/>
+          <a:p>
+            <a:pPr algn="ctr"/>
+            <a:r>
+              <a:rPr lang="en-US" sz="900" dirty="0"/>
+              <a:t>Theorem 3: Every discrete ell embedded by polyhedral loss</a:t>
+            </a:r>
+          </a:p>
+        </p:txBody>
+      </p:sp>
+      <p:cxnSp>
+        <p:nvCxnSpPr>
+          <p:cNvPr id="10" name="Straight Arrow Connector 9">
+            <a:extLst>
+              <a:ext uri="{FF2B5EF4-FFF2-40B4-BE49-F238E27FC236}">
+                <a16:creationId xmlns:a16="http://schemas.microsoft.com/office/drawing/2014/main" id="{EE575D68-F1AD-4E14-AB67-876DB4EDA14B}"/>
+              </a:ext>
+            </a:extLst>
+          </p:cNvPr>
+          <p:cNvCxnSpPr>
+            <a:cxnSpLocks/>
+            <a:stCxn id="4" idx="2"/>
+            <a:endCxn id="5" idx="0"/>
+          </p:cNvCxnSpPr>
+          <p:nvPr/>
+        </p:nvCxnSpPr>
+        <p:spPr>
+          <a:xfrm flipH="1">
+            <a:off x="6556917" y="6794779"/>
+            <a:ext cx="430269" cy="1414103"/>
+          </a:xfrm>
+          <a:prstGeom prst="straightConnector1">
+            <a:avLst/>
+          </a:prstGeom>
+          <a:ln w="38100">
+            <a:solidFill>
+              <a:schemeClr val="tx1"/>
+            </a:solidFill>
+            <a:tailEnd type="triangle"/>
+          </a:ln>
+        </p:spPr>
+        <p:style>
+          <a:lnRef idx="1">
+            <a:schemeClr val="accent1"/>
+          </a:lnRef>
+          <a:fillRef idx="0">
+            <a:schemeClr val="accent1"/>
+          </a:fillRef>
+          <a:effectRef idx="0">
+            <a:schemeClr val="accent1"/>
+          </a:effectRef>
+          <a:fontRef idx="minor">
+            <a:schemeClr val="tx1"/>
+          </a:fontRef>
+        </p:style>
+      </p:cxnSp>
+      <p:sp>
+        <p:nvSpPr>
+          <p:cNvPr id="11" name="Rectangle: Rounded Corners 10">
+            <a:extLst>
+              <a:ext uri="{FF2B5EF4-FFF2-40B4-BE49-F238E27FC236}">
+                <a16:creationId xmlns:a16="http://schemas.microsoft.com/office/drawing/2014/main" id="{1ACD13CD-4ABC-4378-87EB-35EA1EF0E260}"/>
+              </a:ext>
+            </a:extLst>
+          </p:cNvPr>
+          <p:cNvSpPr/>
+          <p:nvPr/>
+        </p:nvSpPr>
+        <p:spPr>
+          <a:xfrm>
+            <a:off x="2263501" y="7087409"/>
+            <a:ext cx="2449742" cy="674371"/>
+          </a:xfrm>
+          <a:prstGeom prst="roundRect">
+            <a:avLst/>
+          </a:prstGeom>
+          <a:solidFill>
+            <a:schemeClr val="accent1"/>
           </a:solidFill>
           <a:ln>
             <a:noFill/>
@@ -5183,18 +5753,202 @@
           <a:p>
             <a:pPr algn="ctr"/>
             <a:r>
-              <a:rPr lang="en-US" sz="1600" dirty="0"/>
-              <a:t>Appendix A</a:t>
-            </a:r>
-          </a:p>
-        </p:txBody>
-      </p:sp>
-      <p:sp>
-        <p:nvSpPr>
-          <p:cNvPr id="20" name="Rectangle: Rounded Corners 19">
-            <a:extLst>
-              <a:ext uri="{FF2B5EF4-FFF2-40B4-BE49-F238E27FC236}">
-                <a16:creationId xmlns:a16="http://schemas.microsoft.com/office/drawing/2014/main" id="{C5189632-25B0-4D44-8B25-623FF67B3E31}"/>
+              <a:rPr lang="en-US" sz="900" dirty="0"/>
+              <a:t>Theorem 1: A cell complex is affinely equivalent to a convex polyhedron if and only if it is a power diagram. </a:t>
+            </a:r>
+          </a:p>
+        </p:txBody>
+      </p:sp>
+      <p:cxnSp>
+        <p:nvCxnSpPr>
+          <p:cNvPr id="12" name="Straight Arrow Connector 11">
+            <a:extLst>
+              <a:ext uri="{FF2B5EF4-FFF2-40B4-BE49-F238E27FC236}">
+                <a16:creationId xmlns:a16="http://schemas.microsoft.com/office/drawing/2014/main" id="{67DFE4CA-23A7-4C6B-8D13-334B391B135E}"/>
+              </a:ext>
+            </a:extLst>
+          </p:cNvPr>
+          <p:cNvCxnSpPr>
+            <a:cxnSpLocks/>
+            <a:stCxn id="11" idx="2"/>
+            <a:endCxn id="5" idx="0"/>
+          </p:cNvCxnSpPr>
+          <p:nvPr/>
+        </p:nvCxnSpPr>
+        <p:spPr>
+          <a:xfrm>
+            <a:off x="3488372" y="7761780"/>
+            <a:ext cx="3068545" cy="447102"/>
+          </a:xfrm>
+          <a:prstGeom prst="straightConnector1">
+            <a:avLst/>
+          </a:prstGeom>
+          <a:ln w="38100">
+            <a:solidFill>
+              <a:schemeClr val="tx1"/>
+            </a:solidFill>
+            <a:tailEnd type="triangle"/>
+          </a:ln>
+        </p:spPr>
+        <p:style>
+          <a:lnRef idx="1">
+            <a:schemeClr val="accent1"/>
+          </a:lnRef>
+          <a:fillRef idx="0">
+            <a:schemeClr val="accent1"/>
+          </a:fillRef>
+          <a:effectRef idx="0">
+            <a:schemeClr val="accent1"/>
+          </a:effectRef>
+          <a:fontRef idx="minor">
+            <a:schemeClr val="tx1"/>
+          </a:fontRef>
+        </p:style>
+      </p:cxnSp>
+      <p:cxnSp>
+        <p:nvCxnSpPr>
+          <p:cNvPr id="15" name="Straight Arrow Connector 14">
+            <a:extLst>
+              <a:ext uri="{FF2B5EF4-FFF2-40B4-BE49-F238E27FC236}">
+                <a16:creationId xmlns:a16="http://schemas.microsoft.com/office/drawing/2014/main" id="{0A42C39F-5421-431B-9400-AE7DDCC7291A}"/>
+              </a:ext>
+            </a:extLst>
+          </p:cNvPr>
+          <p:cNvCxnSpPr>
+            <a:cxnSpLocks/>
+            <a:stCxn id="5" idx="2"/>
+            <a:endCxn id="6" idx="0"/>
+          </p:cNvCxnSpPr>
+          <p:nvPr/>
+        </p:nvCxnSpPr>
+        <p:spPr>
+          <a:xfrm flipH="1">
+            <a:off x="4035231" y="8833278"/>
+            <a:ext cx="2521686" cy="294212"/>
+          </a:xfrm>
+          <a:prstGeom prst="straightConnector1">
+            <a:avLst/>
+          </a:prstGeom>
+          <a:ln w="38100">
+            <a:solidFill>
+              <a:schemeClr val="tx1"/>
+            </a:solidFill>
+            <a:tailEnd type="triangle"/>
+          </a:ln>
+        </p:spPr>
+        <p:style>
+          <a:lnRef idx="1">
+            <a:schemeClr val="accent1"/>
+          </a:lnRef>
+          <a:fillRef idx="0">
+            <a:schemeClr val="accent1"/>
+          </a:fillRef>
+          <a:effectRef idx="0">
+            <a:schemeClr val="accent1"/>
+          </a:effectRef>
+          <a:fontRef idx="minor">
+            <a:schemeClr val="tx1"/>
+          </a:fontRef>
+        </p:style>
+      </p:cxnSp>
+      <p:cxnSp>
+        <p:nvCxnSpPr>
+          <p:cNvPr id="19" name="Straight Arrow Connector 18">
+            <a:extLst>
+              <a:ext uri="{FF2B5EF4-FFF2-40B4-BE49-F238E27FC236}">
+                <a16:creationId xmlns:a16="http://schemas.microsoft.com/office/drawing/2014/main" id="{CD5EBFE9-5CF7-4E67-810A-6D9236A7831A}"/>
+              </a:ext>
+            </a:extLst>
+          </p:cNvPr>
+          <p:cNvCxnSpPr>
+            <a:cxnSpLocks/>
+            <a:stCxn id="11" idx="2"/>
+            <a:endCxn id="6" idx="0"/>
+          </p:cNvCxnSpPr>
+          <p:nvPr/>
+        </p:nvCxnSpPr>
+        <p:spPr>
+          <a:xfrm>
+            <a:off x="3488372" y="7761780"/>
+            <a:ext cx="546859" cy="1365710"/>
+          </a:xfrm>
+          <a:prstGeom prst="straightConnector1">
+            <a:avLst/>
+          </a:prstGeom>
+          <a:ln w="38100">
+            <a:solidFill>
+              <a:schemeClr val="tx1"/>
+            </a:solidFill>
+            <a:tailEnd type="triangle"/>
+          </a:ln>
+        </p:spPr>
+        <p:style>
+          <a:lnRef idx="1">
+            <a:schemeClr val="accent1"/>
+          </a:lnRef>
+          <a:fillRef idx="0">
+            <a:schemeClr val="accent1"/>
+          </a:fillRef>
+          <a:effectRef idx="0">
+            <a:schemeClr val="accent1"/>
+          </a:effectRef>
+          <a:fontRef idx="minor">
+            <a:schemeClr val="tx1"/>
+          </a:fontRef>
+        </p:style>
+      </p:cxnSp>
+      <p:cxnSp>
+        <p:nvCxnSpPr>
+          <p:cNvPr id="24" name="Straight Arrow Connector 23">
+            <a:extLst>
+              <a:ext uri="{FF2B5EF4-FFF2-40B4-BE49-F238E27FC236}">
+                <a16:creationId xmlns:a16="http://schemas.microsoft.com/office/drawing/2014/main" id="{46BA4EBC-5D38-46C6-A4E1-F1890E790213}"/>
+              </a:ext>
+            </a:extLst>
+          </p:cNvPr>
+          <p:cNvCxnSpPr>
+            <a:cxnSpLocks/>
+            <a:stCxn id="6" idx="2"/>
+            <a:endCxn id="7" idx="0"/>
+          </p:cNvCxnSpPr>
+          <p:nvPr/>
+        </p:nvCxnSpPr>
+        <p:spPr>
+          <a:xfrm flipH="1">
+            <a:off x="3263301" y="9721849"/>
+            <a:ext cx="771930" cy="3149939"/>
+          </a:xfrm>
+          <a:prstGeom prst="straightConnector1">
+            <a:avLst/>
+          </a:prstGeom>
+          <a:ln w="38100">
+            <a:solidFill>
+              <a:schemeClr val="tx1"/>
+            </a:solidFill>
+            <a:tailEnd type="triangle"/>
+          </a:ln>
+        </p:spPr>
+        <p:style>
+          <a:lnRef idx="1">
+            <a:schemeClr val="accent1"/>
+          </a:lnRef>
+          <a:fillRef idx="0">
+            <a:schemeClr val="accent1"/>
+          </a:fillRef>
+          <a:effectRef idx="0">
+            <a:schemeClr val="accent1"/>
+          </a:effectRef>
+          <a:fontRef idx="minor">
+            <a:schemeClr val="tx1"/>
+          </a:fontRef>
+        </p:style>
+      </p:cxnSp>
+      <p:sp>
+        <p:nvSpPr>
+          <p:cNvPr id="27" name="Rectangle: Rounded Corners 26">
+            <a:extLst>
+              <a:ext uri="{FF2B5EF4-FFF2-40B4-BE49-F238E27FC236}">
+                <a16:creationId xmlns:a16="http://schemas.microsoft.com/office/drawing/2014/main" id="{DFA8178D-4AEF-4B40-9E6E-7C72CCB7DCDD}"/>
               </a:ext>
             </a:extLst>
           </p:cNvPr>
@@ -5203,8 +5957,417 @@
         </p:nvSpPr>
         <p:spPr>
           <a:xfrm>
-            <a:off x="2194560" y="4062580"/>
-            <a:ext cx="4355096" cy="1198882"/>
+            <a:off x="-125793" y="11663613"/>
+            <a:ext cx="2449742" cy="644334"/>
+          </a:xfrm>
+          <a:prstGeom prst="roundRect">
+            <a:avLst/>
+          </a:prstGeom>
+          <a:solidFill>
+            <a:schemeClr val="accent1"/>
+          </a:solidFill>
+          <a:ln>
+            <a:noFill/>
+          </a:ln>
+        </p:spPr>
+        <p:style>
+          <a:lnRef idx="2">
+            <a:schemeClr val="accent1">
+              <a:shade val="50000"/>
+            </a:schemeClr>
+          </a:lnRef>
+          <a:fillRef idx="1">
+            <a:schemeClr val="accent1"/>
+          </a:fillRef>
+          <a:effectRef idx="0">
+            <a:schemeClr val="accent1"/>
+          </a:effectRef>
+          <a:fontRef idx="minor">
+            <a:schemeClr val="lt1"/>
+          </a:fontRef>
+        </p:style>
+        <p:txBody>
+          <a:bodyPr rtlCol="0" anchor="ctr"/>
+          <a:lstStyle/>
+          <a:p>
+            <a:pPr algn="ctr"/>
+            <a:r>
+              <a:rPr lang="en-US" sz="900" dirty="0"/>
+              <a:t>Lemma 4: L polyhedral implies </a:t>
+            </a:r>
+            <a:r>
+              <a:rPr lang="en-US" sz="900" u="sng" dirty="0"/>
+              <a:t>L</a:t>
+            </a:r>
+            <a:r>
+              <a:rPr lang="en-US" sz="900" dirty="0"/>
+              <a:t> polyhedral</a:t>
+            </a:r>
+            <a:endParaRPr lang="en-US" sz="900" u="sng" dirty="0"/>
+          </a:p>
+        </p:txBody>
+      </p:sp>
+      <p:cxnSp>
+        <p:nvCxnSpPr>
+          <p:cNvPr id="28" name="Straight Arrow Connector 27">
+            <a:extLst>
+              <a:ext uri="{FF2B5EF4-FFF2-40B4-BE49-F238E27FC236}">
+                <a16:creationId xmlns:a16="http://schemas.microsoft.com/office/drawing/2014/main" id="{FA450EDA-F164-45B2-AD9A-DAA6BFCA801F}"/>
+              </a:ext>
+            </a:extLst>
+          </p:cNvPr>
+          <p:cNvCxnSpPr>
+            <a:cxnSpLocks/>
+            <a:stCxn id="27" idx="2"/>
+            <a:endCxn id="7" idx="0"/>
+          </p:cNvCxnSpPr>
+          <p:nvPr/>
+        </p:nvCxnSpPr>
+        <p:spPr>
+          <a:xfrm>
+            <a:off x="1099078" y="12307947"/>
+            <a:ext cx="2164223" cy="563841"/>
+          </a:xfrm>
+          <a:prstGeom prst="straightConnector1">
+            <a:avLst/>
+          </a:prstGeom>
+          <a:ln w="38100">
+            <a:solidFill>
+              <a:schemeClr val="tx1"/>
+            </a:solidFill>
+            <a:tailEnd type="triangle"/>
+          </a:ln>
+        </p:spPr>
+        <p:style>
+          <a:lnRef idx="1">
+            <a:schemeClr val="accent1"/>
+          </a:lnRef>
+          <a:fillRef idx="0">
+            <a:schemeClr val="accent1"/>
+          </a:fillRef>
+          <a:effectRef idx="0">
+            <a:schemeClr val="accent1"/>
+          </a:effectRef>
+          <a:fontRef idx="minor">
+            <a:schemeClr val="tx1"/>
+          </a:fontRef>
+        </p:style>
+      </p:cxnSp>
+      <p:sp>
+        <p:nvSpPr>
+          <p:cNvPr id="49" name="Rectangle: Rounded Corners 48">
+            <a:extLst>
+              <a:ext uri="{FF2B5EF4-FFF2-40B4-BE49-F238E27FC236}">
+                <a16:creationId xmlns:a16="http://schemas.microsoft.com/office/drawing/2014/main" id="{BF638E17-1442-4983-9C79-B0023E438ABD}"/>
+              </a:ext>
+            </a:extLst>
+          </p:cNvPr>
+          <p:cNvSpPr/>
+          <p:nvPr/>
+        </p:nvSpPr>
+        <p:spPr>
+          <a:xfrm>
+            <a:off x="-105254" y="10732756"/>
+            <a:ext cx="2449742" cy="644334"/>
+          </a:xfrm>
+          <a:prstGeom prst="roundRect">
+            <a:avLst/>
+          </a:prstGeom>
+          <a:solidFill>
+            <a:schemeClr val="accent1"/>
+          </a:solidFill>
+          <a:ln>
+            <a:noFill/>
+          </a:ln>
+        </p:spPr>
+        <p:style>
+          <a:lnRef idx="2">
+            <a:schemeClr val="accent1">
+              <a:shade val="50000"/>
+            </a:schemeClr>
+          </a:lnRef>
+          <a:fillRef idx="1">
+            <a:schemeClr val="accent1"/>
+          </a:fillRef>
+          <a:effectRef idx="0">
+            <a:schemeClr val="accent1"/>
+          </a:effectRef>
+          <a:fontRef idx="minor">
+            <a:schemeClr val="lt1"/>
+          </a:fontRef>
+        </p:style>
+        <p:txBody>
+          <a:bodyPr rtlCol="0" anchor="ctr"/>
+          <a:lstStyle/>
+          <a:p>
+            <a:pPr algn="ctr"/>
+            <a:r>
+              <a:rPr lang="en-US" sz="900" dirty="0"/>
+              <a:t>Lemma 3: Range of (property elicited by polyhedral loss) is finite set of closed </a:t>
+            </a:r>
+            <a:r>
+              <a:rPr lang="en-US" sz="900" dirty="0" err="1"/>
+              <a:t>polyhedra</a:t>
+            </a:r>
+            <a:endParaRPr lang="en-US" sz="900" u="sng" dirty="0"/>
+          </a:p>
+        </p:txBody>
+      </p:sp>
+      <p:cxnSp>
+        <p:nvCxnSpPr>
+          <p:cNvPr id="50" name="Straight Arrow Connector 49">
+            <a:extLst>
+              <a:ext uri="{FF2B5EF4-FFF2-40B4-BE49-F238E27FC236}">
+                <a16:creationId xmlns:a16="http://schemas.microsoft.com/office/drawing/2014/main" id="{3F63726C-827B-4847-A7DA-2A9ABAE7B66D}"/>
+              </a:ext>
+            </a:extLst>
+          </p:cNvPr>
+          <p:cNvCxnSpPr>
+            <a:cxnSpLocks/>
+            <a:stCxn id="49" idx="2"/>
+            <a:endCxn id="27" idx="0"/>
+          </p:cNvCxnSpPr>
+          <p:nvPr/>
+        </p:nvCxnSpPr>
+        <p:spPr>
+          <a:xfrm flipH="1">
+            <a:off x="1099078" y="11377090"/>
+            <a:ext cx="20539" cy="286523"/>
+          </a:xfrm>
+          <a:prstGeom prst="straightConnector1">
+            <a:avLst/>
+          </a:prstGeom>
+          <a:ln w="38100">
+            <a:solidFill>
+              <a:schemeClr val="tx1"/>
+            </a:solidFill>
+            <a:tailEnd type="triangle"/>
+          </a:ln>
+        </p:spPr>
+        <p:style>
+          <a:lnRef idx="1">
+            <a:schemeClr val="accent1"/>
+          </a:lnRef>
+          <a:fillRef idx="0">
+            <a:schemeClr val="accent1"/>
+          </a:fillRef>
+          <a:effectRef idx="0">
+            <a:schemeClr val="accent1"/>
+          </a:effectRef>
+          <a:fontRef idx="minor">
+            <a:schemeClr val="tx1"/>
+          </a:fontRef>
+        </p:style>
+      </p:cxnSp>
+      <p:sp>
+        <p:nvSpPr>
+          <p:cNvPr id="58" name="Rectangle: Rounded Corners 57">
+            <a:extLst>
+              <a:ext uri="{FF2B5EF4-FFF2-40B4-BE49-F238E27FC236}">
+                <a16:creationId xmlns:a16="http://schemas.microsoft.com/office/drawing/2014/main" id="{C5AA6F6B-0ED4-448D-85BE-1926F65A65AF}"/>
+              </a:ext>
+            </a:extLst>
+          </p:cNvPr>
+          <p:cNvSpPr/>
+          <p:nvPr/>
+        </p:nvSpPr>
+        <p:spPr>
+          <a:xfrm>
+            <a:off x="-75077" y="9873780"/>
+            <a:ext cx="2449742" cy="674371"/>
+          </a:xfrm>
+          <a:prstGeom prst="roundRect">
+            <a:avLst/>
+          </a:prstGeom>
+          <a:solidFill>
+            <a:schemeClr val="accent1"/>
+          </a:solidFill>
+          <a:ln>
+            <a:noFill/>
+          </a:ln>
+        </p:spPr>
+        <p:style>
+          <a:lnRef idx="2">
+            <a:schemeClr val="accent1">
+              <a:shade val="50000"/>
+            </a:schemeClr>
+          </a:lnRef>
+          <a:fillRef idx="1">
+            <a:schemeClr val="accent1"/>
+          </a:fillRef>
+          <a:effectRef idx="0">
+            <a:schemeClr val="accent1"/>
+          </a:effectRef>
+          <a:fontRef idx="minor">
+            <a:schemeClr val="lt1"/>
+          </a:fontRef>
+        </p:style>
+        <p:txBody>
+          <a:bodyPr rtlCol="0" anchor="ctr"/>
+          <a:lstStyle/>
+          <a:p>
+            <a:pPr algn="ctr"/>
+            <a:r>
+              <a:rPr lang="en-US" sz="900" dirty="0"/>
+              <a:t>Lemma 2: Power diagram induced by (full support) convex combination of polyhedral  functions is same</a:t>
+            </a:r>
+          </a:p>
+        </p:txBody>
+      </p:sp>
+      <p:cxnSp>
+        <p:nvCxnSpPr>
+          <p:cNvPr id="59" name="Straight Arrow Connector 58">
+            <a:extLst>
+              <a:ext uri="{FF2B5EF4-FFF2-40B4-BE49-F238E27FC236}">
+                <a16:creationId xmlns:a16="http://schemas.microsoft.com/office/drawing/2014/main" id="{823F1E0C-E9C5-484D-8DB0-D6967B185ECB}"/>
+              </a:ext>
+            </a:extLst>
+          </p:cNvPr>
+          <p:cNvCxnSpPr>
+            <a:cxnSpLocks/>
+            <a:stCxn id="58" idx="2"/>
+            <a:endCxn id="49" idx="0"/>
+          </p:cNvCxnSpPr>
+          <p:nvPr/>
+        </p:nvCxnSpPr>
+        <p:spPr>
+          <a:xfrm flipH="1">
+            <a:off x="1119617" y="10548151"/>
+            <a:ext cx="30177" cy="184605"/>
+          </a:xfrm>
+          <a:prstGeom prst="straightConnector1">
+            <a:avLst/>
+          </a:prstGeom>
+          <a:ln w="38100">
+            <a:solidFill>
+              <a:schemeClr val="tx1"/>
+            </a:solidFill>
+            <a:tailEnd type="triangle"/>
+          </a:ln>
+        </p:spPr>
+        <p:style>
+          <a:lnRef idx="1">
+            <a:schemeClr val="accent1"/>
+          </a:lnRef>
+          <a:fillRef idx="0">
+            <a:schemeClr val="accent1"/>
+          </a:fillRef>
+          <a:effectRef idx="0">
+            <a:schemeClr val="accent1"/>
+          </a:effectRef>
+          <a:fontRef idx="minor">
+            <a:schemeClr val="tx1"/>
+          </a:fontRef>
+        </p:style>
+      </p:cxnSp>
+      <p:cxnSp>
+        <p:nvCxnSpPr>
+          <p:cNvPr id="69" name="Straight Arrow Connector 68">
+            <a:extLst>
+              <a:ext uri="{FF2B5EF4-FFF2-40B4-BE49-F238E27FC236}">
+                <a16:creationId xmlns:a16="http://schemas.microsoft.com/office/drawing/2014/main" id="{09B03793-CA53-4E0E-A8B9-A851E80347BD}"/>
+              </a:ext>
+            </a:extLst>
+          </p:cNvPr>
+          <p:cNvCxnSpPr>
+            <a:cxnSpLocks/>
+            <a:stCxn id="5" idx="2"/>
+            <a:endCxn id="8" idx="0"/>
+          </p:cNvCxnSpPr>
+          <p:nvPr/>
+        </p:nvCxnSpPr>
+        <p:spPr>
+          <a:xfrm flipH="1">
+            <a:off x="6477482" y="8833278"/>
+            <a:ext cx="79435" cy="4510325"/>
+          </a:xfrm>
+          <a:prstGeom prst="straightConnector1">
+            <a:avLst/>
+          </a:prstGeom>
+          <a:ln w="38100">
+            <a:solidFill>
+              <a:schemeClr val="tx1"/>
+            </a:solidFill>
+            <a:tailEnd type="triangle"/>
+          </a:ln>
+        </p:spPr>
+        <p:style>
+          <a:lnRef idx="1">
+            <a:schemeClr val="accent1"/>
+          </a:lnRef>
+          <a:fillRef idx="0">
+            <a:schemeClr val="accent1"/>
+          </a:fillRef>
+          <a:effectRef idx="0">
+            <a:schemeClr val="accent1"/>
+          </a:effectRef>
+          <a:fontRef idx="minor">
+            <a:schemeClr val="tx1"/>
+          </a:fontRef>
+        </p:style>
+      </p:cxnSp>
+      <p:cxnSp>
+        <p:nvCxnSpPr>
+          <p:cNvPr id="74" name="Straight Arrow Connector 73">
+            <a:extLst>
+              <a:ext uri="{FF2B5EF4-FFF2-40B4-BE49-F238E27FC236}">
+                <a16:creationId xmlns:a16="http://schemas.microsoft.com/office/drawing/2014/main" id="{77E24319-533D-4B38-A1DB-BC37EFDDAA70}"/>
+              </a:ext>
+            </a:extLst>
+          </p:cNvPr>
+          <p:cNvCxnSpPr>
+            <a:cxnSpLocks/>
+            <a:stCxn id="5" idx="2"/>
+            <a:endCxn id="73" idx="0"/>
+          </p:cNvCxnSpPr>
+          <p:nvPr/>
+        </p:nvCxnSpPr>
+        <p:spPr>
+          <a:xfrm>
+            <a:off x="6556917" y="8833278"/>
+            <a:ext cx="4344645" cy="926602"/>
+          </a:xfrm>
+          <a:prstGeom prst="straightConnector1">
+            <a:avLst/>
+          </a:prstGeom>
+          <a:ln w="38100">
+            <a:solidFill>
+              <a:schemeClr val="tx1"/>
+            </a:solidFill>
+            <a:tailEnd type="triangle"/>
+          </a:ln>
+        </p:spPr>
+        <p:style>
+          <a:lnRef idx="1">
+            <a:schemeClr val="accent1"/>
+          </a:lnRef>
+          <a:fillRef idx="0">
+            <a:schemeClr val="accent1"/>
+          </a:fillRef>
+          <a:effectRef idx="0">
+            <a:schemeClr val="accent1"/>
+          </a:effectRef>
+          <a:fontRef idx="minor">
+            <a:schemeClr val="tx1"/>
+          </a:fontRef>
+        </p:style>
+      </p:cxnSp>
+      <p:sp>
+        <p:nvSpPr>
+          <p:cNvPr id="94" name="Rectangle: Rounded Corners 93">
+            <a:extLst>
+              <a:ext uri="{FF2B5EF4-FFF2-40B4-BE49-F238E27FC236}">
+                <a16:creationId xmlns:a16="http://schemas.microsoft.com/office/drawing/2014/main" id="{304E3A0C-8736-4BD1-9A8B-1131AA9F70CF}"/>
+              </a:ext>
+            </a:extLst>
+          </p:cNvPr>
+          <p:cNvSpPr/>
+          <p:nvPr/>
+        </p:nvSpPr>
+        <p:spPr>
+          <a:xfrm>
+            <a:off x="10784859" y="8479006"/>
+            <a:ext cx="2449742" cy="674371"/>
           </a:xfrm>
           <a:prstGeom prst="roundRect">
             <a:avLst/>
@@ -5238,18 +6401,64 @@
           <a:p>
             <a:pPr algn="ctr"/>
             <a:r>
-              <a:rPr lang="en-US" sz="1600" dirty="0"/>
-              <a:t>Section 5: Embedding Properties (rename)</a:t>
-            </a:r>
-          </a:p>
-        </p:txBody>
-      </p:sp>
-      <p:sp>
-        <p:nvSpPr>
-          <p:cNvPr id="22" name="Rectangle: Rounded Corners 21">
-            <a:extLst>
-              <a:ext uri="{FF2B5EF4-FFF2-40B4-BE49-F238E27FC236}">
-                <a16:creationId xmlns:a16="http://schemas.microsoft.com/office/drawing/2014/main" id="{4B4DE2E5-89E3-48D2-940C-9498D3800B2F}"/>
+              <a:rPr lang="en-US" sz="900" dirty="0"/>
+              <a:t>Lemma 6: Negative Bayes risk is polyhedral and projection forms power diagram</a:t>
+            </a:r>
+          </a:p>
+        </p:txBody>
+      </p:sp>
+      <p:cxnSp>
+        <p:nvCxnSpPr>
+          <p:cNvPr id="95" name="Straight Arrow Connector 94">
+            <a:extLst>
+              <a:ext uri="{FF2B5EF4-FFF2-40B4-BE49-F238E27FC236}">
+                <a16:creationId xmlns:a16="http://schemas.microsoft.com/office/drawing/2014/main" id="{A38A0F91-9E06-4E37-9361-978463A4B570}"/>
+              </a:ext>
+            </a:extLst>
+          </p:cNvPr>
+          <p:cNvCxnSpPr>
+            <a:cxnSpLocks/>
+            <a:stCxn id="11" idx="2"/>
+            <a:endCxn id="94" idx="0"/>
+          </p:cNvCxnSpPr>
+          <p:nvPr/>
+        </p:nvCxnSpPr>
+        <p:spPr>
+          <a:xfrm>
+            <a:off x="3488372" y="7761780"/>
+            <a:ext cx="8521358" cy="717226"/>
+          </a:xfrm>
+          <a:prstGeom prst="straightConnector1">
+            <a:avLst/>
+          </a:prstGeom>
+          <a:ln w="38100">
+            <a:solidFill>
+              <a:schemeClr val="tx1"/>
+            </a:solidFill>
+            <a:tailEnd type="triangle"/>
+          </a:ln>
+        </p:spPr>
+        <p:style>
+          <a:lnRef idx="1">
+            <a:schemeClr val="accent1"/>
+          </a:lnRef>
+          <a:fillRef idx="0">
+            <a:schemeClr val="accent1"/>
+          </a:fillRef>
+          <a:effectRef idx="0">
+            <a:schemeClr val="accent1"/>
+          </a:effectRef>
+          <a:fontRef idx="minor">
+            <a:schemeClr val="tx1"/>
+          </a:fontRef>
+        </p:style>
+      </p:cxnSp>
+      <p:sp>
+        <p:nvSpPr>
+          <p:cNvPr id="107" name="Rectangle: Rounded Corners 106">
+            <a:extLst>
+              <a:ext uri="{FF2B5EF4-FFF2-40B4-BE49-F238E27FC236}">
+                <a16:creationId xmlns:a16="http://schemas.microsoft.com/office/drawing/2014/main" id="{92F32F00-7CA6-4458-8112-5B85BE9B2DBE}"/>
               </a:ext>
             </a:extLst>
           </p:cNvPr>
@@ -5258,8 +6467,521 @@
         </p:nvSpPr>
         <p:spPr>
           <a:xfrm>
-            <a:off x="2194560" y="2318841"/>
-            <a:ext cx="4355096" cy="1198882"/>
+            <a:off x="9413016" y="11214556"/>
+            <a:ext cx="2449742" cy="674371"/>
+          </a:xfrm>
+          <a:prstGeom prst="roundRect">
+            <a:avLst/>
+          </a:prstGeom>
+          <a:solidFill>
+            <a:srgbClr val="7030A0"/>
+          </a:solidFill>
+          <a:ln>
+            <a:noFill/>
+          </a:ln>
+        </p:spPr>
+        <p:style>
+          <a:lnRef idx="2">
+            <a:schemeClr val="accent1">
+              <a:shade val="50000"/>
+            </a:schemeClr>
+          </a:lnRef>
+          <a:fillRef idx="1">
+            <a:schemeClr val="accent1"/>
+          </a:fillRef>
+          <a:effectRef idx="0">
+            <a:schemeClr val="accent1"/>
+          </a:effectRef>
+          <a:fontRef idx="minor">
+            <a:schemeClr val="lt1"/>
+          </a:fontRef>
+        </p:style>
+        <p:txBody>
+          <a:bodyPr rtlCol="0" anchor="ctr"/>
+          <a:lstStyle/>
+          <a:p>
+            <a:pPr algn="ctr"/>
+            <a:r>
+              <a:rPr lang="en-US" sz="900" dirty="0"/>
+              <a:t>Lemma 7:Embedding property implies level sets are same up to trim</a:t>
+            </a:r>
+          </a:p>
+        </p:txBody>
+      </p:sp>
+      <p:cxnSp>
+        <p:nvCxnSpPr>
+          <p:cNvPr id="108" name="Straight Arrow Connector 107">
+            <a:extLst>
+              <a:ext uri="{FF2B5EF4-FFF2-40B4-BE49-F238E27FC236}">
+                <a16:creationId xmlns:a16="http://schemas.microsoft.com/office/drawing/2014/main" id="{CCC78FBA-4A4A-46A9-B95A-048E233343E5}"/>
+              </a:ext>
+            </a:extLst>
+          </p:cNvPr>
+          <p:cNvCxnSpPr>
+            <a:cxnSpLocks/>
+            <a:stCxn id="73" idx="2"/>
+            <a:endCxn id="107" idx="0"/>
+          </p:cNvCxnSpPr>
+          <p:nvPr/>
+        </p:nvCxnSpPr>
+        <p:spPr>
+          <a:xfrm flipH="1">
+            <a:off x="10637887" y="10434251"/>
+            <a:ext cx="263675" cy="780305"/>
+          </a:xfrm>
+          <a:prstGeom prst="straightConnector1">
+            <a:avLst/>
+          </a:prstGeom>
+          <a:ln w="38100">
+            <a:solidFill>
+              <a:schemeClr val="tx1"/>
+            </a:solidFill>
+            <a:tailEnd type="triangle"/>
+          </a:ln>
+        </p:spPr>
+        <p:style>
+          <a:lnRef idx="1">
+            <a:schemeClr val="accent1"/>
+          </a:lnRef>
+          <a:fillRef idx="0">
+            <a:schemeClr val="accent1"/>
+          </a:fillRef>
+          <a:effectRef idx="0">
+            <a:schemeClr val="accent1"/>
+          </a:effectRef>
+          <a:fontRef idx="minor">
+            <a:schemeClr val="tx1"/>
+          </a:fontRef>
+        </p:style>
+      </p:cxnSp>
+      <p:cxnSp>
+        <p:nvCxnSpPr>
+          <p:cNvPr id="112" name="Straight Arrow Connector 111">
+            <a:extLst>
+              <a:ext uri="{FF2B5EF4-FFF2-40B4-BE49-F238E27FC236}">
+                <a16:creationId xmlns:a16="http://schemas.microsoft.com/office/drawing/2014/main" id="{1C1DE463-7419-461F-B211-9C95421FDED9}"/>
+              </a:ext>
+            </a:extLst>
+          </p:cNvPr>
+          <p:cNvCxnSpPr>
+            <a:cxnSpLocks/>
+            <a:stCxn id="5" idx="2"/>
+            <a:endCxn id="107" idx="0"/>
+          </p:cNvCxnSpPr>
+          <p:nvPr/>
+        </p:nvCxnSpPr>
+        <p:spPr>
+          <a:xfrm>
+            <a:off x="6556917" y="8833278"/>
+            <a:ext cx="4080970" cy="2381278"/>
+          </a:xfrm>
+          <a:prstGeom prst="straightConnector1">
+            <a:avLst/>
+          </a:prstGeom>
+          <a:ln w="38100">
+            <a:solidFill>
+              <a:schemeClr val="tx1"/>
+            </a:solidFill>
+            <a:tailEnd type="triangle"/>
+          </a:ln>
+        </p:spPr>
+        <p:style>
+          <a:lnRef idx="1">
+            <a:schemeClr val="accent1"/>
+          </a:lnRef>
+          <a:fillRef idx="0">
+            <a:schemeClr val="accent1"/>
+          </a:fillRef>
+          <a:effectRef idx="0">
+            <a:schemeClr val="accent1"/>
+          </a:effectRef>
+          <a:fontRef idx="minor">
+            <a:schemeClr val="tx1"/>
+          </a:fontRef>
+        </p:style>
+      </p:cxnSp>
+      <p:sp>
+        <p:nvSpPr>
+          <p:cNvPr id="73" name="Rectangle: Rounded Corners 72">
+            <a:extLst>
+              <a:ext uri="{FF2B5EF4-FFF2-40B4-BE49-F238E27FC236}">
+                <a16:creationId xmlns:a16="http://schemas.microsoft.com/office/drawing/2014/main" id="{559022AE-B1B7-426C-B2E6-C88223F337A9}"/>
+              </a:ext>
+            </a:extLst>
+          </p:cNvPr>
+          <p:cNvSpPr/>
+          <p:nvPr/>
+        </p:nvSpPr>
+        <p:spPr>
+          <a:xfrm>
+            <a:off x="9676691" y="9759880"/>
+            <a:ext cx="2449742" cy="674371"/>
+          </a:xfrm>
+          <a:prstGeom prst="roundRect">
+            <a:avLst/>
+          </a:prstGeom>
+          <a:solidFill>
+            <a:srgbClr val="7030A0"/>
+          </a:solidFill>
+          <a:ln>
+            <a:noFill/>
+          </a:ln>
+        </p:spPr>
+        <p:style>
+          <a:lnRef idx="2">
+            <a:schemeClr val="accent1">
+              <a:shade val="50000"/>
+            </a:schemeClr>
+          </a:lnRef>
+          <a:fillRef idx="1">
+            <a:schemeClr val="accent1"/>
+          </a:fillRef>
+          <a:effectRef idx="0">
+            <a:schemeClr val="accent1"/>
+          </a:effectRef>
+          <a:fontRef idx="minor">
+            <a:schemeClr val="lt1"/>
+          </a:fontRef>
+        </p:style>
+        <p:txBody>
+          <a:bodyPr rtlCol="0" anchor="ctr"/>
+          <a:lstStyle/>
+          <a:p>
+            <a:pPr algn="ctr"/>
+            <a:r>
+              <a:rPr lang="en-US" sz="900" dirty="0"/>
+              <a:t>Lemma 5: property embedding implies loss embedding</a:t>
+            </a:r>
+          </a:p>
+        </p:txBody>
+      </p:sp>
+      <p:sp>
+        <p:nvSpPr>
+          <p:cNvPr id="117" name="Rectangle: Rounded Corners 116">
+            <a:extLst>
+              <a:ext uri="{FF2B5EF4-FFF2-40B4-BE49-F238E27FC236}">
+                <a16:creationId xmlns:a16="http://schemas.microsoft.com/office/drawing/2014/main" id="{5B57C8BD-CB9D-4DAA-92C9-D39B57216BDF}"/>
+              </a:ext>
+            </a:extLst>
+          </p:cNvPr>
+          <p:cNvSpPr/>
+          <p:nvPr/>
+        </p:nvSpPr>
+        <p:spPr>
+          <a:xfrm>
+            <a:off x="9729699" y="12719207"/>
+            <a:ext cx="2449742" cy="674371"/>
+          </a:xfrm>
+          <a:prstGeom prst="roundRect">
+            <a:avLst/>
+          </a:prstGeom>
+          <a:solidFill>
+            <a:srgbClr val="7030A0"/>
+          </a:solidFill>
+          <a:ln>
+            <a:noFill/>
+          </a:ln>
+        </p:spPr>
+        <p:style>
+          <a:lnRef idx="2">
+            <a:schemeClr val="accent1">
+              <a:shade val="50000"/>
+            </a:schemeClr>
+          </a:lnRef>
+          <a:fillRef idx="1">
+            <a:schemeClr val="accent1"/>
+          </a:fillRef>
+          <a:effectRef idx="0">
+            <a:schemeClr val="accent1"/>
+          </a:effectRef>
+          <a:fontRef idx="minor">
+            <a:schemeClr val="lt1"/>
+          </a:fontRef>
+        </p:style>
+        <p:txBody>
+          <a:bodyPr rtlCol="0" anchor="ctr"/>
+          <a:lstStyle/>
+          <a:p>
+            <a:pPr algn="ctr"/>
+            <a:r>
+              <a:rPr lang="en-US" sz="900" dirty="0"/>
+              <a:t>Prop 3: TFAE: Embed finite prop, trim finite, finite set of FDLS</a:t>
+            </a:r>
+          </a:p>
+        </p:txBody>
+      </p:sp>
+      <p:cxnSp>
+        <p:nvCxnSpPr>
+          <p:cNvPr id="121" name="Straight Arrow Connector 120">
+            <a:extLst>
+              <a:ext uri="{FF2B5EF4-FFF2-40B4-BE49-F238E27FC236}">
+                <a16:creationId xmlns:a16="http://schemas.microsoft.com/office/drawing/2014/main" id="{872463F1-602B-4690-BAAD-FA52621B8C7E}"/>
+              </a:ext>
+            </a:extLst>
+          </p:cNvPr>
+          <p:cNvCxnSpPr>
+            <a:cxnSpLocks/>
+            <a:stCxn id="107" idx="2"/>
+            <a:endCxn id="117" idx="0"/>
+          </p:cNvCxnSpPr>
+          <p:nvPr/>
+        </p:nvCxnSpPr>
+        <p:spPr>
+          <a:xfrm>
+            <a:off x="10637887" y="11888927"/>
+            <a:ext cx="316683" cy="830280"/>
+          </a:xfrm>
+          <a:prstGeom prst="straightConnector1">
+            <a:avLst/>
+          </a:prstGeom>
+          <a:ln w="38100">
+            <a:solidFill>
+              <a:schemeClr val="tx1"/>
+            </a:solidFill>
+            <a:tailEnd type="triangle"/>
+          </a:ln>
+        </p:spPr>
+        <p:style>
+          <a:lnRef idx="1">
+            <a:schemeClr val="accent1"/>
+          </a:lnRef>
+          <a:fillRef idx="0">
+            <a:schemeClr val="accent1"/>
+          </a:fillRef>
+          <a:effectRef idx="0">
+            <a:schemeClr val="accent1"/>
+          </a:effectRef>
+          <a:fontRef idx="minor">
+            <a:schemeClr val="tx1"/>
+          </a:fontRef>
+        </p:style>
+      </p:cxnSp>
+      <p:sp>
+        <p:nvSpPr>
+          <p:cNvPr id="161" name="Rectangle: Rounded Corners 160">
+            <a:extLst>
+              <a:ext uri="{FF2B5EF4-FFF2-40B4-BE49-F238E27FC236}">
+                <a16:creationId xmlns:a16="http://schemas.microsoft.com/office/drawing/2014/main" id="{A31CDD69-85F0-47B3-843C-975FDDCD2930}"/>
+              </a:ext>
+            </a:extLst>
+          </p:cNvPr>
+          <p:cNvSpPr/>
+          <p:nvPr/>
+        </p:nvSpPr>
+        <p:spPr>
+          <a:xfrm>
+            <a:off x="10089218" y="15540604"/>
+            <a:ext cx="2449742" cy="674371"/>
+          </a:xfrm>
+          <a:prstGeom prst="roundRect">
+            <a:avLst/>
+          </a:prstGeom>
+          <a:solidFill>
+            <a:srgbClr val="7030A0"/>
+          </a:solidFill>
+          <a:ln>
+            <a:noFill/>
+          </a:ln>
+        </p:spPr>
+        <p:style>
+          <a:lnRef idx="2">
+            <a:schemeClr val="accent1">
+              <a:shade val="50000"/>
+            </a:schemeClr>
+          </a:lnRef>
+          <a:fillRef idx="1">
+            <a:schemeClr val="accent1"/>
+          </a:fillRef>
+          <a:effectRef idx="0">
+            <a:schemeClr val="accent1"/>
+          </a:effectRef>
+          <a:fontRef idx="minor">
+            <a:schemeClr val="lt1"/>
+          </a:fontRef>
+        </p:style>
+        <p:txBody>
+          <a:bodyPr rtlCol="0" anchor="ctr"/>
+          <a:lstStyle/>
+          <a:p>
+            <a:pPr algn="ctr"/>
+            <a:r>
+              <a:rPr lang="en-US" sz="900" dirty="0"/>
+              <a:t>Theorem 5: Poly loss embeds finite prop. Moreover, poly loss indirectly elicits prop </a:t>
+            </a:r>
+            <a:r>
+              <a:rPr lang="en-US" sz="900" dirty="0" err="1"/>
+              <a:t>iff</a:t>
+            </a:r>
+            <a:r>
+              <a:rPr lang="en-US" sz="900" dirty="0"/>
+              <a:t> it embeds a property refining the original</a:t>
+            </a:r>
+          </a:p>
+        </p:txBody>
+      </p:sp>
+      <p:cxnSp>
+        <p:nvCxnSpPr>
+          <p:cNvPr id="163" name="Straight Arrow Connector 162">
+            <a:extLst>
+              <a:ext uri="{FF2B5EF4-FFF2-40B4-BE49-F238E27FC236}">
+                <a16:creationId xmlns:a16="http://schemas.microsoft.com/office/drawing/2014/main" id="{ED579112-1DA3-4094-88A6-4DC0BE550862}"/>
+              </a:ext>
+            </a:extLst>
+          </p:cNvPr>
+          <p:cNvCxnSpPr>
+            <a:cxnSpLocks/>
+            <a:stCxn id="7" idx="2"/>
+            <a:endCxn id="161" idx="0"/>
+          </p:cNvCxnSpPr>
+          <p:nvPr/>
+        </p:nvCxnSpPr>
+        <p:spPr>
+          <a:xfrm>
+            <a:off x="3263301" y="13393578"/>
+            <a:ext cx="8050788" cy="2147026"/>
+          </a:xfrm>
+          <a:prstGeom prst="straightConnector1">
+            <a:avLst/>
+          </a:prstGeom>
+          <a:ln w="38100">
+            <a:solidFill>
+              <a:schemeClr val="tx1"/>
+            </a:solidFill>
+            <a:tailEnd type="triangle"/>
+          </a:ln>
+        </p:spPr>
+        <p:style>
+          <a:lnRef idx="1">
+            <a:schemeClr val="accent1"/>
+          </a:lnRef>
+          <a:fillRef idx="0">
+            <a:schemeClr val="accent1"/>
+          </a:fillRef>
+          <a:effectRef idx="0">
+            <a:schemeClr val="accent1"/>
+          </a:effectRef>
+          <a:fontRef idx="minor">
+            <a:schemeClr val="tx1"/>
+          </a:fontRef>
+        </p:style>
+      </p:cxnSp>
+      <p:sp>
+        <p:nvSpPr>
+          <p:cNvPr id="167" name="Rectangle: Rounded Corners 166">
+            <a:extLst>
+              <a:ext uri="{FF2B5EF4-FFF2-40B4-BE49-F238E27FC236}">
+                <a16:creationId xmlns:a16="http://schemas.microsoft.com/office/drawing/2014/main" id="{C6E5CC10-9EB3-4DED-8412-7756CE79660F}"/>
+              </a:ext>
+            </a:extLst>
+          </p:cNvPr>
+          <p:cNvSpPr/>
+          <p:nvPr/>
+        </p:nvSpPr>
+        <p:spPr>
+          <a:xfrm>
+            <a:off x="10089218" y="17521043"/>
+            <a:ext cx="2449742" cy="674371"/>
+          </a:xfrm>
+          <a:prstGeom prst="roundRect">
+            <a:avLst/>
+          </a:prstGeom>
+          <a:solidFill>
+            <a:srgbClr val="7030A0"/>
+          </a:solidFill>
+          <a:ln>
+            <a:noFill/>
+          </a:ln>
+        </p:spPr>
+        <p:style>
+          <a:lnRef idx="2">
+            <a:schemeClr val="accent1">
+              <a:shade val="50000"/>
+            </a:schemeClr>
+          </a:lnRef>
+          <a:fillRef idx="1">
+            <a:schemeClr val="accent1"/>
+          </a:fillRef>
+          <a:effectRef idx="0">
+            <a:schemeClr val="accent1"/>
+          </a:effectRef>
+          <a:fontRef idx="minor">
+            <a:schemeClr val="lt1"/>
+          </a:fontRef>
+        </p:style>
+        <p:txBody>
+          <a:bodyPr rtlCol="0" anchor="ctr"/>
+          <a:lstStyle/>
+          <a:p>
+            <a:pPr algn="ctr"/>
+            <a:r>
+              <a:rPr lang="en-US" sz="900" dirty="0"/>
+              <a:t>Theorem 6: Poly loss indirectly elicits implies consistent</a:t>
+            </a:r>
+          </a:p>
+        </p:txBody>
+      </p:sp>
+      <p:cxnSp>
+        <p:nvCxnSpPr>
+          <p:cNvPr id="174" name="Straight Arrow Connector 173">
+            <a:extLst>
+              <a:ext uri="{FF2B5EF4-FFF2-40B4-BE49-F238E27FC236}">
+                <a16:creationId xmlns:a16="http://schemas.microsoft.com/office/drawing/2014/main" id="{82850390-1090-490F-AE9B-FB233615A6AB}"/>
+              </a:ext>
+            </a:extLst>
+          </p:cNvPr>
+          <p:cNvCxnSpPr>
+            <a:cxnSpLocks/>
+            <a:stCxn id="161" idx="2"/>
+            <a:endCxn id="167" idx="0"/>
+          </p:cNvCxnSpPr>
+          <p:nvPr/>
+        </p:nvCxnSpPr>
+        <p:spPr>
+          <a:xfrm>
+            <a:off x="11314089" y="16214975"/>
+            <a:ext cx="0" cy="1306068"/>
+          </a:xfrm>
+          <a:prstGeom prst="straightConnector1">
+            <a:avLst/>
+          </a:prstGeom>
+          <a:ln w="38100">
+            <a:solidFill>
+              <a:schemeClr val="tx1"/>
+            </a:solidFill>
+            <a:tailEnd type="triangle"/>
+          </a:ln>
+        </p:spPr>
+        <p:style>
+          <a:lnRef idx="1">
+            <a:schemeClr val="accent1"/>
+          </a:lnRef>
+          <a:fillRef idx="0">
+            <a:schemeClr val="accent1"/>
+          </a:fillRef>
+          <a:effectRef idx="0">
+            <a:schemeClr val="accent1"/>
+          </a:effectRef>
+          <a:fontRef idx="minor">
+            <a:schemeClr val="tx1"/>
+          </a:fontRef>
+        </p:style>
+      </p:cxnSp>
+      <p:sp>
+        <p:nvSpPr>
+          <p:cNvPr id="177" name="Rectangle: Rounded Corners 176">
+            <a:extLst>
+              <a:ext uri="{FF2B5EF4-FFF2-40B4-BE49-F238E27FC236}">
+                <a16:creationId xmlns:a16="http://schemas.microsoft.com/office/drawing/2014/main" id="{88E0CFB5-2452-4D43-9629-7C3DC6145F2F}"/>
+              </a:ext>
+            </a:extLst>
+          </p:cNvPr>
+          <p:cNvSpPr/>
+          <p:nvPr/>
+        </p:nvSpPr>
+        <p:spPr>
+          <a:xfrm>
+            <a:off x="3144112" y="16262948"/>
+            <a:ext cx="2449742" cy="674371"/>
           </a:xfrm>
           <a:prstGeom prst="roundRect">
             <a:avLst/>
@@ -5293,7 +7015,393 @@
           <a:p>
             <a:pPr algn="ctr"/>
             <a:r>
-              <a:rPr lang="en-US" sz="1600" dirty="0"/>
+              <a:rPr lang="en-US" sz="900" dirty="0"/>
+              <a:t>Theorem 4: Embedding implies calibration</a:t>
+            </a:r>
+          </a:p>
+        </p:txBody>
+      </p:sp>
+      <p:cxnSp>
+        <p:nvCxnSpPr>
+          <p:cNvPr id="178" name="Straight Arrow Connector 177">
+            <a:extLst>
+              <a:ext uri="{FF2B5EF4-FFF2-40B4-BE49-F238E27FC236}">
+                <a16:creationId xmlns:a16="http://schemas.microsoft.com/office/drawing/2014/main" id="{6C7C3B37-D195-4ACD-B1B0-EDEFBD58A167}"/>
+              </a:ext>
+            </a:extLst>
+          </p:cNvPr>
+          <p:cNvCxnSpPr>
+            <a:cxnSpLocks/>
+            <a:stCxn id="177" idx="2"/>
+            <a:endCxn id="167" idx="0"/>
+          </p:cNvCxnSpPr>
+          <p:nvPr/>
+        </p:nvCxnSpPr>
+        <p:spPr>
+          <a:xfrm>
+            <a:off x="4368983" y="16937319"/>
+            <a:ext cx="6945106" cy="583724"/>
+          </a:xfrm>
+          <a:prstGeom prst="straightConnector1">
+            <a:avLst/>
+          </a:prstGeom>
+          <a:ln w="38100">
+            <a:solidFill>
+              <a:schemeClr val="tx1"/>
+            </a:solidFill>
+            <a:tailEnd type="triangle"/>
+          </a:ln>
+        </p:spPr>
+        <p:style>
+          <a:lnRef idx="1">
+            <a:schemeClr val="accent1"/>
+          </a:lnRef>
+          <a:fillRef idx="0">
+            <a:schemeClr val="accent1"/>
+          </a:fillRef>
+          <a:effectRef idx="0">
+            <a:schemeClr val="accent1"/>
+          </a:effectRef>
+          <a:fontRef idx="minor">
+            <a:schemeClr val="tx1"/>
+          </a:fontRef>
+        </p:style>
+      </p:cxnSp>
+      <p:cxnSp>
+        <p:nvCxnSpPr>
+          <p:cNvPr id="181" name="Straight Arrow Connector 180">
+            <a:extLst>
+              <a:ext uri="{FF2B5EF4-FFF2-40B4-BE49-F238E27FC236}">
+                <a16:creationId xmlns:a16="http://schemas.microsoft.com/office/drawing/2014/main" id="{FE3462FD-9920-441D-B04B-F75765E78E1C}"/>
+              </a:ext>
+            </a:extLst>
+          </p:cNvPr>
+          <p:cNvCxnSpPr>
+            <a:cxnSpLocks/>
+            <a:stCxn id="7" idx="2"/>
+            <a:endCxn id="177" idx="0"/>
+          </p:cNvCxnSpPr>
+          <p:nvPr/>
+        </p:nvCxnSpPr>
+        <p:spPr>
+          <a:xfrm>
+            <a:off x="3263301" y="13393578"/>
+            <a:ext cx="1105682" cy="2869370"/>
+          </a:xfrm>
+          <a:prstGeom prst="straightConnector1">
+            <a:avLst/>
+          </a:prstGeom>
+          <a:ln w="38100">
+            <a:solidFill>
+              <a:schemeClr val="tx1"/>
+            </a:solidFill>
+            <a:tailEnd type="triangle"/>
+          </a:ln>
+        </p:spPr>
+        <p:style>
+          <a:lnRef idx="1">
+            <a:schemeClr val="accent1"/>
+          </a:lnRef>
+          <a:fillRef idx="0">
+            <a:schemeClr val="accent1"/>
+          </a:fillRef>
+          <a:effectRef idx="0">
+            <a:schemeClr val="accent1"/>
+          </a:effectRef>
+          <a:fontRef idx="minor">
+            <a:schemeClr val="tx1"/>
+          </a:fontRef>
+        </p:style>
+      </p:cxnSp>
+      <p:sp>
+        <p:nvSpPr>
+          <p:cNvPr id="252" name="TextBox 251">
+            <a:extLst>
+              <a:ext uri="{FF2B5EF4-FFF2-40B4-BE49-F238E27FC236}">
+                <a16:creationId xmlns:a16="http://schemas.microsoft.com/office/drawing/2014/main" id="{E75D84A4-04C0-4CB8-A46B-1DE1CB3A234C}"/>
+              </a:ext>
+            </a:extLst>
+          </p:cNvPr>
+          <p:cNvSpPr txBox="1"/>
+          <p:nvPr/>
+        </p:nvSpPr>
+        <p:spPr>
+          <a:xfrm>
+            <a:off x="596076" y="6529805"/>
+            <a:ext cx="1047082" cy="369332"/>
+          </a:xfrm>
+          <a:prstGeom prst="rect">
+            <a:avLst/>
+          </a:prstGeom>
+          <a:noFill/>
+        </p:spPr>
+        <p:txBody>
+          <a:bodyPr wrap="none" rtlCol="0">
+            <a:spAutoFit/>
+          </a:bodyPr>
+          <a:lstStyle/>
+          <a:p>
+            <a:r>
+              <a:rPr lang="en-US" dirty="0"/>
+              <a:t>Section 3</a:t>
+            </a:r>
+          </a:p>
+        </p:txBody>
+      </p:sp>
+      <p:sp>
+        <p:nvSpPr>
+          <p:cNvPr id="261" name="TextBox 260">
+            <a:extLst>
+              <a:ext uri="{FF2B5EF4-FFF2-40B4-BE49-F238E27FC236}">
+                <a16:creationId xmlns:a16="http://schemas.microsoft.com/office/drawing/2014/main" id="{75CC1909-7C54-478F-8EC3-AFCA2E9ADDC4}"/>
+              </a:ext>
+            </a:extLst>
+          </p:cNvPr>
+          <p:cNvSpPr txBox="1"/>
+          <p:nvPr/>
+        </p:nvSpPr>
+        <p:spPr>
+          <a:xfrm>
+            <a:off x="11862758" y="7590062"/>
+            <a:ext cx="1047082" cy="369332"/>
+          </a:xfrm>
+          <a:prstGeom prst="rect">
+            <a:avLst/>
+          </a:prstGeom>
+          <a:noFill/>
+        </p:spPr>
+        <p:txBody>
+          <a:bodyPr wrap="none" rtlCol="0">
+            <a:spAutoFit/>
+          </a:bodyPr>
+          <a:lstStyle/>
+          <a:p>
+            <a:r>
+              <a:rPr lang="en-US" dirty="0"/>
+              <a:t>Section 5</a:t>
+            </a:r>
+          </a:p>
+        </p:txBody>
+      </p:sp>
+      <p:sp>
+        <p:nvSpPr>
+          <p:cNvPr id="263" name="TextBox 262">
+            <a:extLst>
+              <a:ext uri="{FF2B5EF4-FFF2-40B4-BE49-F238E27FC236}">
+                <a16:creationId xmlns:a16="http://schemas.microsoft.com/office/drawing/2014/main" id="{CCA70F02-B976-4F0C-98D7-BD1B92495F9A}"/>
+              </a:ext>
+            </a:extLst>
+          </p:cNvPr>
+          <p:cNvSpPr txBox="1"/>
+          <p:nvPr/>
+        </p:nvSpPr>
+        <p:spPr>
+          <a:xfrm>
+            <a:off x="1954322" y="15803434"/>
+            <a:ext cx="1047082" cy="369332"/>
+          </a:xfrm>
+          <a:prstGeom prst="rect">
+            <a:avLst/>
+          </a:prstGeom>
+          <a:noFill/>
+        </p:spPr>
+        <p:txBody>
+          <a:bodyPr wrap="none" rtlCol="0">
+            <a:spAutoFit/>
+          </a:bodyPr>
+          <a:lstStyle/>
+          <a:p>
+            <a:r>
+              <a:rPr lang="en-US" dirty="0"/>
+              <a:t>Section 4</a:t>
+            </a:r>
+          </a:p>
+        </p:txBody>
+      </p:sp>
+    </p:spTree>
+    <p:extLst>
+      <p:ext uri="{BB962C8B-B14F-4D97-AF65-F5344CB8AC3E}">
+        <p14:creationId xmlns:p14="http://schemas.microsoft.com/office/powerpoint/2010/main" val="962866158"/>
+      </p:ext>
+    </p:extLst>
+  </p:cSld>
+  <p:clrMapOvr>
+    <a:masterClrMapping/>
+  </p:clrMapOvr>
+</p:sld>
+</file>
+
+<file path=ppt/slides/slide3.xml><?xml version="1.0" encoding="utf-8"?>
+<p:sld xmlns:a="http://schemas.openxmlformats.org/drawingml/2006/main" xmlns:r="http://schemas.openxmlformats.org/officeDocument/2006/relationships" xmlns:p="http://schemas.openxmlformats.org/presentationml/2006/main">
+  <p:cSld>
+    <p:spTree>
+      <p:nvGrpSpPr>
+        <p:cNvPr id="1" name=""/>
+        <p:cNvGrpSpPr/>
+        <p:nvPr/>
+      </p:nvGrpSpPr>
+      <p:grpSpPr>
+        <a:xfrm>
+          <a:off x="0" y="0"/>
+          <a:ext cx="0" cy="0"/>
+          <a:chOff x="0" y="0"/>
+          <a:chExt cx="0" cy="0"/>
+        </a:xfrm>
+      </p:grpSpPr>
+      <p:sp>
+        <p:nvSpPr>
+          <p:cNvPr id="4" name="Rectangle: Rounded Corners 3">
+            <a:extLst>
+              <a:ext uri="{FF2B5EF4-FFF2-40B4-BE49-F238E27FC236}">
+                <a16:creationId xmlns:a16="http://schemas.microsoft.com/office/drawing/2014/main" id="{5283EF00-AC17-4142-A880-694C5177FF7D}"/>
+              </a:ext>
+            </a:extLst>
+          </p:cNvPr>
+          <p:cNvSpPr/>
+          <p:nvPr/>
+        </p:nvSpPr>
+        <p:spPr>
+          <a:xfrm>
+            <a:off x="1234440" y="8657870"/>
+            <a:ext cx="2449742" cy="674371"/>
+          </a:xfrm>
+          <a:prstGeom prst="roundRect">
+            <a:avLst/>
+          </a:prstGeom>
+        </p:spPr>
+        <p:style>
+          <a:lnRef idx="2">
+            <a:schemeClr val="accent1">
+              <a:shade val="50000"/>
+            </a:schemeClr>
+          </a:lnRef>
+          <a:fillRef idx="1">
+            <a:schemeClr val="accent1"/>
+          </a:fillRef>
+          <a:effectRef idx="0">
+            <a:schemeClr val="accent1"/>
+          </a:effectRef>
+          <a:fontRef idx="minor">
+            <a:schemeClr val="lt1"/>
+          </a:fontRef>
+        </p:style>
+        <p:txBody>
+          <a:bodyPr rtlCol="0" anchor="ctr"/>
+          <a:lstStyle/>
+          <a:p>
+            <a:pPr algn="ctr"/>
+            <a:r>
+              <a:rPr lang="en-US" sz="900" dirty="0"/>
+              <a:t>Section 3: Embeddings and Polyhedral Losses</a:t>
+            </a:r>
+          </a:p>
+        </p:txBody>
+      </p:sp>
+      <p:sp>
+        <p:nvSpPr>
+          <p:cNvPr id="20" name="Rectangle: Rounded Corners 19">
+            <a:extLst>
+              <a:ext uri="{FF2B5EF4-FFF2-40B4-BE49-F238E27FC236}">
+                <a16:creationId xmlns:a16="http://schemas.microsoft.com/office/drawing/2014/main" id="{C5189632-25B0-4D44-8B25-623FF67B3E31}"/>
+              </a:ext>
+            </a:extLst>
+          </p:cNvPr>
+          <p:cNvSpPr/>
+          <p:nvPr/>
+        </p:nvSpPr>
+        <p:spPr>
+          <a:xfrm>
+            <a:off x="1234440" y="10619576"/>
+            <a:ext cx="2449742" cy="674371"/>
+          </a:xfrm>
+          <a:prstGeom prst="roundRect">
+            <a:avLst/>
+          </a:prstGeom>
+          <a:solidFill>
+            <a:srgbClr val="7030A0"/>
+          </a:solidFill>
+          <a:ln>
+            <a:noFill/>
+          </a:ln>
+        </p:spPr>
+        <p:style>
+          <a:lnRef idx="2">
+            <a:schemeClr val="accent1">
+              <a:shade val="50000"/>
+            </a:schemeClr>
+          </a:lnRef>
+          <a:fillRef idx="1">
+            <a:schemeClr val="accent1"/>
+          </a:fillRef>
+          <a:effectRef idx="0">
+            <a:schemeClr val="accent1"/>
+          </a:effectRef>
+          <a:fontRef idx="minor">
+            <a:schemeClr val="lt1"/>
+          </a:fontRef>
+        </p:style>
+        <p:txBody>
+          <a:bodyPr rtlCol="0" anchor="ctr"/>
+          <a:lstStyle/>
+          <a:p>
+            <a:pPr algn="ctr"/>
+            <a:r>
+              <a:rPr lang="en-US" sz="900" dirty="0"/>
+              <a:t>Section 5: Embedding Properties (rename)</a:t>
+            </a:r>
+          </a:p>
+        </p:txBody>
+      </p:sp>
+      <p:sp>
+        <p:nvSpPr>
+          <p:cNvPr id="22" name="Rectangle: Rounded Corners 21">
+            <a:extLst>
+              <a:ext uri="{FF2B5EF4-FFF2-40B4-BE49-F238E27FC236}">
+                <a16:creationId xmlns:a16="http://schemas.microsoft.com/office/drawing/2014/main" id="{4B4DE2E5-89E3-48D2-940C-9498D3800B2F}"/>
+              </a:ext>
+            </a:extLst>
+          </p:cNvPr>
+          <p:cNvSpPr/>
+          <p:nvPr/>
+        </p:nvSpPr>
+        <p:spPr>
+          <a:xfrm>
+            <a:off x="1234440" y="9638723"/>
+            <a:ext cx="2449742" cy="674371"/>
+          </a:xfrm>
+          <a:prstGeom prst="roundRect">
+            <a:avLst/>
+          </a:prstGeom>
+          <a:solidFill>
+            <a:srgbClr val="00B0F0"/>
+          </a:solidFill>
+          <a:ln>
+            <a:noFill/>
+          </a:ln>
+        </p:spPr>
+        <p:style>
+          <a:lnRef idx="2">
+            <a:schemeClr val="accent1">
+              <a:shade val="50000"/>
+            </a:schemeClr>
+          </a:lnRef>
+          <a:fillRef idx="1">
+            <a:schemeClr val="accent1"/>
+          </a:fillRef>
+          <a:effectRef idx="0">
+            <a:schemeClr val="accent1"/>
+          </a:effectRef>
+          <a:fontRef idx="minor">
+            <a:schemeClr val="lt1"/>
+          </a:fontRef>
+        </p:style>
+        <p:txBody>
+          <a:bodyPr rtlCol="0" anchor="ctr"/>
+          <a:lstStyle/>
+          <a:p>
+            <a:pPr algn="ctr"/>
+            <a:r>
+              <a:rPr lang="en-US" sz="900" dirty="0"/>
               <a:t>Section 4: Consistency via Calibrated links</a:t>
             </a:r>
           </a:p>

</xml_diff>